<commit_message>
Created Component 2 delivery/click and collect menu
Created Component 2 delivery/click and collect menu
</commit_message>
<xml_diff>
--- a/Dannel Rajesh - 000_91896 _ 91897 Documentation - 1026292.pptx
+++ b/Dannel Rajesh - 000_91896 _ 91897 Documentation - 1026292.pptx
@@ -5,7 +5,7 @@
     <p:sldMasterId id="2147483659" r:id="rId1"/>
   </p:sldMasterIdLst>
   <p:notesMasterIdLst>
-    <p:notesMasterId r:id="rId37"/>
+    <p:notesMasterId r:id="rId39"/>
   </p:notesMasterIdLst>
   <p:sldIdLst>
     <p:sldId id="256" r:id="rId2"/>
@@ -28,21 +28,23 @@
     <p:sldId id="291" r:id="rId19"/>
     <p:sldId id="290" r:id="rId20"/>
     <p:sldId id="272" r:id="rId21"/>
-    <p:sldId id="273" r:id="rId22"/>
-    <p:sldId id="274" r:id="rId23"/>
-    <p:sldId id="275" r:id="rId24"/>
-    <p:sldId id="276" r:id="rId25"/>
-    <p:sldId id="277" r:id="rId26"/>
-    <p:sldId id="278" r:id="rId27"/>
-    <p:sldId id="279" r:id="rId28"/>
-    <p:sldId id="280" r:id="rId29"/>
-    <p:sldId id="281" r:id="rId30"/>
-    <p:sldId id="285" r:id="rId31"/>
-    <p:sldId id="261" r:id="rId32"/>
-    <p:sldId id="284" r:id="rId33"/>
-    <p:sldId id="286" r:id="rId34"/>
-    <p:sldId id="287" r:id="rId35"/>
-    <p:sldId id="262" r:id="rId36"/>
+    <p:sldId id="292" r:id="rId22"/>
+    <p:sldId id="273" r:id="rId23"/>
+    <p:sldId id="293" r:id="rId24"/>
+    <p:sldId id="274" r:id="rId25"/>
+    <p:sldId id="275" r:id="rId26"/>
+    <p:sldId id="276" r:id="rId27"/>
+    <p:sldId id="277" r:id="rId28"/>
+    <p:sldId id="278" r:id="rId29"/>
+    <p:sldId id="279" r:id="rId30"/>
+    <p:sldId id="280" r:id="rId31"/>
+    <p:sldId id="281" r:id="rId32"/>
+    <p:sldId id="285" r:id="rId33"/>
+    <p:sldId id="261" r:id="rId34"/>
+    <p:sldId id="284" r:id="rId35"/>
+    <p:sldId id="286" r:id="rId36"/>
+    <p:sldId id="287" r:id="rId37"/>
+    <p:sldId id="262" r:id="rId38"/>
   </p:sldIdLst>
   <p:sldSz cx="9144000" cy="5143500" type="screen16x9"/>
   <p:notesSz cx="6858000" cy="9144000"/>
@@ -297,9 +299,7 @@
 <file path=ppt/revisionInfo.xml><?xml version="1.0" encoding="utf-8"?>
 <p1510:revInfo xmlns:a="http://schemas.openxmlformats.org/drawingml/2006/main" xmlns:r="http://schemas.openxmlformats.org/officeDocument/2006/relationships" xmlns:p1510="http://schemas.microsoft.com/office/powerpoint/2015/10/main">
   <p1510:revLst>
-    <p1510:client id="{2FAEA527-C876-4776-B57B-2AF537C29DB7}" v="2" dt="2023-06-19T00:09:57.630"/>
-    <p1510:client id="{939780F9-BE2D-54AF-55B9-1FB7B70720A0}" v="147" dt="2023-06-18T23:58:23.957"/>
-    <p1510:client id="{B92634BF-A28A-49D1-EE03-0D9F83BD6FA5}" v="17" dt="2023-06-18T23:38:06.530"/>
+    <p1510:client id="{2FAEA527-C876-4776-B57B-2AF537C29DB7}" v="3" dt="2023-06-22T02:36:32.940"/>
   </p1510:revLst>
 </p1510:revInfo>
 </file>
@@ -308,11 +308,73 @@
 <pc:chgInfo xmlns:a="http://schemas.openxmlformats.org/drawingml/2006/main" xmlns:r="http://schemas.openxmlformats.org/officeDocument/2006/relationships" xmlns:ac="http://schemas.microsoft.com/office/drawing/2013/main/command" xmlns:pc="http://schemas.microsoft.com/office/powerpoint/2013/main/command">
   <pc:docChgLst>
     <pc:chgData name="Dannel Rajesh" userId="b39f31be-f29f-4100-b1b4-3789a0f884c3" providerId="ADAL" clId="{2FAEA527-C876-4776-B57B-2AF537C29DB7}"/>
-    <pc:docChg chg="modSld">
-      <pc:chgData name="Dannel Rajesh" userId="b39f31be-f29f-4100-b1b4-3789a0f884c3" providerId="ADAL" clId="{2FAEA527-C876-4776-B57B-2AF537C29DB7}" dt="2023-06-19T00:09:57.630" v="13"/>
+    <pc:docChg chg="custSel addSld modSld">
+      <pc:chgData name="Dannel Rajesh" userId="b39f31be-f29f-4100-b1b4-3789a0f884c3" providerId="ADAL" clId="{2FAEA527-C876-4776-B57B-2AF537C29DB7}" dt="2023-06-22T02:38:25.880" v="107" actId="20577"/>
       <pc:docMkLst>
         <pc:docMk/>
       </pc:docMkLst>
+      <pc:sldChg chg="addSp modSp mod">
+        <pc:chgData name="Dannel Rajesh" userId="b39f31be-f29f-4100-b1b4-3789a0f884c3" providerId="ADAL" clId="{2FAEA527-C876-4776-B57B-2AF537C29DB7}" dt="2023-06-22T02:29:00.227" v="70" actId="20577"/>
+        <pc:sldMkLst>
+          <pc:docMk/>
+          <pc:sldMk cId="2095003138" sldId="272"/>
+        </pc:sldMkLst>
+        <pc:spChg chg="mod">
+          <ac:chgData name="Dannel Rajesh" userId="b39f31be-f29f-4100-b1b4-3789a0f884c3" providerId="ADAL" clId="{2FAEA527-C876-4776-B57B-2AF537C29DB7}" dt="2023-06-22T02:29:00.227" v="70" actId="20577"/>
+          <ac:spMkLst>
+            <pc:docMk/>
+            <pc:sldMk cId="2095003138" sldId="272"/>
+            <ac:spMk id="73" creationId="{00000000-0000-0000-0000-000000000000}"/>
+          </ac:spMkLst>
+        </pc:spChg>
+        <pc:picChg chg="add mod">
+          <ac:chgData name="Dannel Rajesh" userId="b39f31be-f29f-4100-b1b4-3789a0f884c3" providerId="ADAL" clId="{2FAEA527-C876-4776-B57B-2AF537C29DB7}" dt="2023-06-22T02:28:48.415" v="66" actId="1076"/>
+          <ac:picMkLst>
+            <pc:docMk/>
+            <pc:sldMk cId="2095003138" sldId="272"/>
+            <ac:picMk id="3" creationId="{4DB4DFF6-2AA9-D86D-6BE0-C1CFA6A90862}"/>
+          </ac:picMkLst>
+        </pc:picChg>
+      </pc:sldChg>
+      <pc:sldChg chg="addSp modSp mod">
+        <pc:chgData name="Dannel Rajesh" userId="b39f31be-f29f-4100-b1b4-3789a0f884c3" providerId="ADAL" clId="{2FAEA527-C876-4776-B57B-2AF537C29DB7}" dt="2023-06-22T02:38:12.651" v="102" actId="20577"/>
+        <pc:sldMkLst>
+          <pc:docMk/>
+          <pc:sldMk cId="2116980625" sldId="273"/>
+        </pc:sldMkLst>
+        <pc:spChg chg="mod">
+          <ac:chgData name="Dannel Rajesh" userId="b39f31be-f29f-4100-b1b4-3789a0f884c3" providerId="ADAL" clId="{2FAEA527-C876-4776-B57B-2AF537C29DB7}" dt="2023-06-22T02:38:12.651" v="102" actId="20577"/>
+          <ac:spMkLst>
+            <pc:docMk/>
+            <pc:sldMk cId="2116980625" sldId="273"/>
+            <ac:spMk id="78" creationId="{00000000-0000-0000-0000-000000000000}"/>
+          </ac:spMkLst>
+        </pc:spChg>
+        <pc:graphicFrameChg chg="mod modGraphic">
+          <ac:chgData name="Dannel Rajesh" userId="b39f31be-f29f-4100-b1b4-3789a0f884c3" providerId="ADAL" clId="{2FAEA527-C876-4776-B57B-2AF537C29DB7}" dt="2023-06-22T02:36:45.943" v="100" actId="20577"/>
+          <ac:graphicFrameMkLst>
+            <pc:docMk/>
+            <pc:sldMk cId="2116980625" sldId="273"/>
+            <ac:graphicFrameMk id="79" creationId="{00000000-0000-0000-0000-000000000000}"/>
+          </ac:graphicFrameMkLst>
+        </pc:graphicFrameChg>
+        <pc:picChg chg="add mod">
+          <ac:chgData name="Dannel Rajesh" userId="b39f31be-f29f-4100-b1b4-3789a0f884c3" providerId="ADAL" clId="{2FAEA527-C876-4776-B57B-2AF537C29DB7}" dt="2023-06-22T02:36:22.213" v="93" actId="14100"/>
+          <ac:picMkLst>
+            <pc:docMk/>
+            <pc:sldMk cId="2116980625" sldId="273"/>
+            <ac:picMk id="3" creationId="{A7198EF8-2B81-E035-3B18-820FB2C7A90F}"/>
+          </ac:picMkLst>
+        </pc:picChg>
+        <pc:picChg chg="add mod">
+          <ac:chgData name="Dannel Rajesh" userId="b39f31be-f29f-4100-b1b4-3789a0f884c3" providerId="ADAL" clId="{2FAEA527-C876-4776-B57B-2AF537C29DB7}" dt="2023-06-22T02:36:19.579" v="92" actId="14100"/>
+          <ac:picMkLst>
+            <pc:docMk/>
+            <pc:sldMk cId="2116980625" sldId="273"/>
+            <ac:picMk id="5" creationId="{CFC09E8D-F2B6-7EF7-49EE-46E6FC408015}"/>
+          </ac:picMkLst>
+        </pc:picChg>
+      </pc:sldChg>
       <pc:sldChg chg="addSp modSp mod">
         <pc:chgData name="Dannel Rajesh" userId="b39f31be-f29f-4100-b1b4-3789a0f884c3" providerId="ADAL" clId="{2FAEA527-C876-4776-B57B-2AF537C29DB7}" dt="2023-06-19T00:09:57.630" v="13"/>
         <pc:sldMkLst>
@@ -366,6 +428,68 @@
             <ac:spMk id="73" creationId="{00000000-0000-0000-0000-000000000000}"/>
           </ac:spMkLst>
         </pc:spChg>
+      </pc:sldChg>
+      <pc:sldChg chg="addSp delSp modSp add mod">
+        <pc:chgData name="Dannel Rajesh" userId="b39f31be-f29f-4100-b1b4-3789a0f884c3" providerId="ADAL" clId="{2FAEA527-C876-4776-B57B-2AF537C29DB7}" dt="2023-06-22T02:28:56.395" v="67"/>
+        <pc:sldMkLst>
+          <pc:docMk/>
+          <pc:sldMk cId="1031046766" sldId="292"/>
+        </pc:sldMkLst>
+        <pc:spChg chg="mod">
+          <ac:chgData name="Dannel Rajesh" userId="b39f31be-f29f-4100-b1b4-3789a0f884c3" providerId="ADAL" clId="{2FAEA527-C876-4776-B57B-2AF537C29DB7}" dt="2023-06-22T02:28:56.395" v="67"/>
+          <ac:spMkLst>
+            <pc:docMk/>
+            <pc:sldMk cId="1031046766" sldId="292"/>
+            <ac:spMk id="73" creationId="{00000000-0000-0000-0000-000000000000}"/>
+          </ac:spMkLst>
+        </pc:spChg>
+        <pc:picChg chg="del">
+          <ac:chgData name="Dannel Rajesh" userId="b39f31be-f29f-4100-b1b4-3789a0f884c3" providerId="ADAL" clId="{2FAEA527-C876-4776-B57B-2AF537C29DB7}" dt="2023-06-22T02:27:54.576" v="20" actId="21"/>
+          <ac:picMkLst>
+            <pc:docMk/>
+            <pc:sldMk cId="1031046766" sldId="292"/>
+            <ac:picMk id="3" creationId="{4DB4DFF6-2AA9-D86D-6BE0-C1CFA6A90862}"/>
+          </ac:picMkLst>
+        </pc:picChg>
+        <pc:picChg chg="add mod">
+          <ac:chgData name="Dannel Rajesh" userId="b39f31be-f29f-4100-b1b4-3789a0f884c3" providerId="ADAL" clId="{2FAEA527-C876-4776-B57B-2AF537C29DB7}" dt="2023-06-22T02:27:55.710" v="21" actId="1076"/>
+          <ac:picMkLst>
+            <pc:docMk/>
+            <pc:sldMk cId="1031046766" sldId="292"/>
+            <ac:picMk id="4" creationId="{CF60C6C1-0AB0-E112-4EF5-CC80603B4BF0}"/>
+          </ac:picMkLst>
+        </pc:picChg>
+      </pc:sldChg>
+      <pc:sldChg chg="delSp modSp add mod">
+        <pc:chgData name="Dannel Rajesh" userId="b39f31be-f29f-4100-b1b4-3789a0f884c3" providerId="ADAL" clId="{2FAEA527-C876-4776-B57B-2AF537C29DB7}" dt="2023-06-22T02:38:25.880" v="107" actId="20577"/>
+        <pc:sldMkLst>
+          <pc:docMk/>
+          <pc:sldMk cId="568505923" sldId="293"/>
+        </pc:sldMkLst>
+        <pc:spChg chg="mod">
+          <ac:chgData name="Dannel Rajesh" userId="b39f31be-f29f-4100-b1b4-3789a0f884c3" providerId="ADAL" clId="{2FAEA527-C876-4776-B57B-2AF537C29DB7}" dt="2023-06-22T02:38:25.880" v="107" actId="20577"/>
+          <ac:spMkLst>
+            <pc:docMk/>
+            <pc:sldMk cId="568505923" sldId="293"/>
+            <ac:spMk id="78" creationId="{00000000-0000-0000-0000-000000000000}"/>
+          </ac:spMkLst>
+        </pc:spChg>
+        <pc:picChg chg="del">
+          <ac:chgData name="Dannel Rajesh" userId="b39f31be-f29f-4100-b1b4-3789a0f884c3" providerId="ADAL" clId="{2FAEA527-C876-4776-B57B-2AF537C29DB7}" dt="2023-06-22T02:38:22.488" v="105" actId="21"/>
+          <ac:picMkLst>
+            <pc:docMk/>
+            <pc:sldMk cId="568505923" sldId="293"/>
+            <ac:picMk id="3" creationId="{A7198EF8-2B81-E035-3B18-820FB2C7A90F}"/>
+          </ac:picMkLst>
+        </pc:picChg>
+        <pc:picChg chg="del">
+          <ac:chgData name="Dannel Rajesh" userId="b39f31be-f29f-4100-b1b4-3789a0f884c3" providerId="ADAL" clId="{2FAEA527-C876-4776-B57B-2AF537C29DB7}" dt="2023-06-22T02:38:21.214" v="104" actId="21"/>
+          <ac:picMkLst>
+            <pc:docMk/>
+            <pc:sldMk cId="568505923" sldId="293"/>
+            <ac:picMk id="5" creationId="{CFC09E8D-F2B6-7EF7-49EE-46E6FC408015}"/>
+          </ac:picMkLst>
+        </pc:picChg>
       </pc:sldChg>
     </pc:docChg>
   </pc:docChgLst>
@@ -1016,7 +1140,7 @@
     </p:spTree>
     <p:extLst>
       <p:ext uri="{BB962C8B-B14F-4D97-AF65-F5344CB8AC3E}">
-        <p14:creationId xmlns:p14="http://schemas.microsoft.com/office/powerpoint/2010/main" val="3059957658"/>
+        <p14:creationId xmlns:p14="http://schemas.microsoft.com/office/powerpoint/2010/main" val="177968427"/>
       </p:ext>
     </p:extLst>
   </p:cSld>
@@ -1125,7 +1249,7 @@
     </p:spTree>
     <p:extLst>
       <p:ext uri="{BB962C8B-B14F-4D97-AF65-F5344CB8AC3E}">
-        <p14:creationId xmlns:p14="http://schemas.microsoft.com/office/powerpoint/2010/main" val="3253485423"/>
+        <p14:creationId xmlns:p14="http://schemas.microsoft.com/office/powerpoint/2010/main" val="3145666181"/>
       </p:ext>
     </p:extLst>
   </p:cSld>
@@ -1234,7 +1358,7 @@
     </p:spTree>
     <p:extLst>
       <p:ext uri="{BB962C8B-B14F-4D97-AF65-F5344CB8AC3E}">
-        <p14:creationId xmlns:p14="http://schemas.microsoft.com/office/powerpoint/2010/main" val="1209413496"/>
+        <p14:creationId xmlns:p14="http://schemas.microsoft.com/office/powerpoint/2010/main" val="3059957658"/>
       </p:ext>
     </p:extLst>
   </p:cSld>
@@ -1343,7 +1467,7 @@
     </p:spTree>
     <p:extLst>
       <p:ext uri="{BB962C8B-B14F-4D97-AF65-F5344CB8AC3E}">
-        <p14:creationId xmlns:p14="http://schemas.microsoft.com/office/powerpoint/2010/main" val="698637762"/>
+        <p14:creationId xmlns:p14="http://schemas.microsoft.com/office/powerpoint/2010/main" val="3253485423"/>
       </p:ext>
     </p:extLst>
   </p:cSld>
@@ -1452,7 +1576,7 @@
     </p:spTree>
     <p:extLst>
       <p:ext uri="{BB962C8B-B14F-4D97-AF65-F5344CB8AC3E}">
-        <p14:creationId xmlns:p14="http://schemas.microsoft.com/office/powerpoint/2010/main" val="3726156782"/>
+        <p14:creationId xmlns:p14="http://schemas.microsoft.com/office/powerpoint/2010/main" val="1209413496"/>
       </p:ext>
     </p:extLst>
   </p:cSld>
@@ -1561,7 +1685,7 @@
     </p:spTree>
     <p:extLst>
       <p:ext uri="{BB962C8B-B14F-4D97-AF65-F5344CB8AC3E}">
-        <p14:creationId xmlns:p14="http://schemas.microsoft.com/office/powerpoint/2010/main" val="784738588"/>
+        <p14:creationId xmlns:p14="http://schemas.microsoft.com/office/powerpoint/2010/main" val="698637762"/>
       </p:ext>
     </p:extLst>
   </p:cSld>
@@ -1670,7 +1794,7 @@
     </p:spTree>
     <p:extLst>
       <p:ext uri="{BB962C8B-B14F-4D97-AF65-F5344CB8AC3E}">
-        <p14:creationId xmlns:p14="http://schemas.microsoft.com/office/powerpoint/2010/main" val="3494323208"/>
+        <p14:creationId xmlns:p14="http://schemas.microsoft.com/office/powerpoint/2010/main" val="3726156782"/>
       </p:ext>
     </p:extLst>
   </p:cSld>
@@ -1685,7 +1809,7 @@
   <p:cSld>
     <p:spTree>
       <p:nvGrpSpPr>
-        <p:cNvPr id="1" name="Shape 80"/>
+        <p:cNvPr id="1" name="Shape 69"/>
         <p:cNvGrpSpPr/>
         <p:nvPr/>
       </p:nvGrpSpPr>
@@ -1699,7 +1823,7 @@
       </p:grpSpPr>
       <p:sp>
         <p:nvSpPr>
-          <p:cNvPr id="81" name="Google Shape;81;gac10fef634_0_25:notes"/>
+          <p:cNvPr id="70" name="Google Shape;70;gac10fef634_0_16:notes"/>
           <p:cNvSpPr>
             <a:spLocks noGrp="1" noRot="1" noChangeAspect="1"/>
           </p:cNvSpPr>
@@ -1740,7 +1864,7 @@
       </p:sp>
       <p:sp>
         <p:nvSpPr>
-          <p:cNvPr id="82" name="Google Shape;82;gac10fef634_0_25:notes"/>
+          <p:cNvPr id="71" name="Google Shape;71;gac10fef634_0_16:notes"/>
           <p:cNvSpPr txBox="1">
             <a:spLocks noGrp="1"/>
           </p:cNvSpPr>
@@ -1770,27 +1894,6 @@
               <a:spcAft>
                 <a:spcPts val="0"/>
               </a:spcAft>
-              <a:buClr>
-                <a:schemeClr val="dk1"/>
-              </a:buClr>
-              <a:buSzPts val="1100"/>
-              <a:buFont typeface="Arial"/>
-              <a:buNone/>
-            </a:pPr>
-            <a:r>
-              <a:rPr lang="en"/>
-              <a:t>Your version control evidence should go here.  This could be in the form of annotated screenshots which show you you managed this process or you could make a brief screencast explaining how you implemented version control.</a:t>
-            </a:r>
-            <a:endParaRPr/>
-          </a:p>
-          <a:p>
-            <a:pPr marL="0" lvl="0" indent="0" algn="l" rtl="0">
-              <a:spcBef>
-                <a:spcPts val="0"/>
-              </a:spcBef>
-              <a:spcAft>
-                <a:spcPts val="0"/>
-              </a:spcAft>
               <a:buNone/>
             </a:pPr>
             <a:endParaRPr/>
@@ -1798,6 +1901,11 @@
         </p:txBody>
       </p:sp>
     </p:spTree>
+    <p:extLst>
+      <p:ext uri="{BB962C8B-B14F-4D97-AF65-F5344CB8AC3E}">
+        <p14:creationId xmlns:p14="http://schemas.microsoft.com/office/powerpoint/2010/main" val="784738588"/>
+      </p:ext>
+    </p:extLst>
   </p:cSld>
   <p:clrMapOvr>
     <a:masterClrMapping/>
@@ -1810,7 +1918,7 @@
   <p:cSld>
     <p:spTree>
       <p:nvGrpSpPr>
-        <p:cNvPr id="1" name="Shape 80"/>
+        <p:cNvPr id="1" name="Shape 74"/>
         <p:cNvGrpSpPr/>
         <p:nvPr/>
       </p:nvGrpSpPr>
@@ -1824,7 +1932,7 @@
       </p:grpSpPr>
       <p:sp>
         <p:nvSpPr>
-          <p:cNvPr id="81" name="Google Shape;81;gac10fef634_0_25:notes"/>
+          <p:cNvPr id="75" name="Google Shape;75;gac10fef634_0_20:notes"/>
           <p:cNvSpPr>
             <a:spLocks noGrp="1" noRot="1" noChangeAspect="1"/>
           </p:cNvSpPr>
@@ -1865,7 +1973,7 @@
       </p:sp>
       <p:sp>
         <p:nvSpPr>
-          <p:cNvPr id="82" name="Google Shape;82;gac10fef634_0_25:notes"/>
+          <p:cNvPr id="76" name="Google Shape;76;gac10fef634_0_20:notes"/>
           <p:cNvSpPr txBox="1">
             <a:spLocks noGrp="1"/>
           </p:cNvSpPr>
@@ -1895,27 +2003,6 @@
               <a:spcAft>
                 <a:spcPts val="0"/>
               </a:spcAft>
-              <a:buClr>
-                <a:schemeClr val="dk1"/>
-              </a:buClr>
-              <a:buSzPts val="1100"/>
-              <a:buFont typeface="Arial"/>
-              <a:buNone/>
-            </a:pPr>
-            <a:r>
-              <a:rPr lang="en"/>
-              <a:t>Your version control evidence should go here.  This could be in the form of annotated screenshots which show you you managed this process or you could make a brief screencast explaining how you implemented version control.</a:t>
-            </a:r>
-            <a:endParaRPr/>
-          </a:p>
-          <a:p>
-            <a:pPr marL="0" lvl="0" indent="0" algn="l" rtl="0">
-              <a:spcBef>
-                <a:spcPts val="0"/>
-              </a:spcBef>
-              <a:spcAft>
-                <a:spcPts val="0"/>
-              </a:spcAft>
               <a:buNone/>
             </a:pPr>
             <a:endParaRPr/>
@@ -1925,7 +2012,7 @@
     </p:spTree>
     <p:extLst>
       <p:ext uri="{BB962C8B-B14F-4D97-AF65-F5344CB8AC3E}">
-        <p14:creationId xmlns:p14="http://schemas.microsoft.com/office/powerpoint/2010/main" val="511959585"/>
+        <p14:creationId xmlns:p14="http://schemas.microsoft.com/office/powerpoint/2010/main" val="3494323208"/>
       </p:ext>
     </p:extLst>
   </p:cSld>
@@ -2053,11 +2140,6 @@
         </p:txBody>
       </p:sp>
     </p:spTree>
-    <p:extLst>
-      <p:ext uri="{BB962C8B-B14F-4D97-AF65-F5344CB8AC3E}">
-        <p14:creationId xmlns:p14="http://schemas.microsoft.com/office/powerpoint/2010/main" val="3815843750"/>
-      </p:ext>
-    </p:extLst>
   </p:cSld>
   <p:clrMapOvr>
     <a:masterClrMapping/>
@@ -2191,6 +2273,266 @@
 </file>
 
 <file path=ppt/notesSlides/notesSlide20.xml><?xml version="1.0" encoding="utf-8"?>
+<p:notes xmlns:a="http://schemas.openxmlformats.org/drawingml/2006/main" xmlns:r="http://schemas.openxmlformats.org/officeDocument/2006/relationships" xmlns:p="http://schemas.openxmlformats.org/presentationml/2006/main" showMasterSp="0" showMasterPhAnim="0">
+  <p:cSld>
+    <p:spTree>
+      <p:nvGrpSpPr>
+        <p:cNvPr id="1" name="Shape 80"/>
+        <p:cNvGrpSpPr/>
+        <p:nvPr/>
+      </p:nvGrpSpPr>
+      <p:grpSpPr>
+        <a:xfrm>
+          <a:off x="0" y="0"/>
+          <a:ext cx="0" cy="0"/>
+          <a:chOff x="0" y="0"/>
+          <a:chExt cx="0" cy="0"/>
+        </a:xfrm>
+      </p:grpSpPr>
+      <p:sp>
+        <p:nvSpPr>
+          <p:cNvPr id="81" name="Google Shape;81;gac10fef634_0_25:notes"/>
+          <p:cNvSpPr>
+            <a:spLocks noGrp="1" noRot="1" noChangeAspect="1"/>
+          </p:cNvSpPr>
+          <p:nvPr>
+            <p:ph type="sldImg" idx="2"/>
+          </p:nvPr>
+        </p:nvSpPr>
+        <p:spPr>
+          <a:xfrm>
+            <a:off x="381000" y="685800"/>
+            <a:ext cx="6096000" cy="3429000"/>
+          </a:xfrm>
+          <a:custGeom>
+            <a:avLst/>
+            <a:gdLst/>
+            <a:ahLst/>
+            <a:cxnLst/>
+            <a:rect l="l" t="t" r="r" b="b"/>
+            <a:pathLst>
+              <a:path w="120000" h="120000" extrusionOk="0">
+                <a:moveTo>
+                  <a:pt x="0" y="0"/>
+                </a:moveTo>
+                <a:lnTo>
+                  <a:pt x="120000" y="0"/>
+                </a:lnTo>
+                <a:lnTo>
+                  <a:pt x="120000" y="120000"/>
+                </a:lnTo>
+                <a:lnTo>
+                  <a:pt x="0" y="120000"/>
+                </a:lnTo>
+                <a:close/>
+              </a:path>
+            </a:pathLst>
+          </a:custGeom>
+        </p:spPr>
+      </p:sp>
+      <p:sp>
+        <p:nvSpPr>
+          <p:cNvPr id="82" name="Google Shape;82;gac10fef634_0_25:notes"/>
+          <p:cNvSpPr txBox="1">
+            <a:spLocks noGrp="1"/>
+          </p:cNvSpPr>
+          <p:nvPr>
+            <p:ph type="body" idx="1"/>
+          </p:nvPr>
+        </p:nvSpPr>
+        <p:spPr>
+          <a:xfrm>
+            <a:off x="685800" y="4343400"/>
+            <a:ext cx="5486400" cy="4114800"/>
+          </a:xfrm>
+          <a:prstGeom prst="rect">
+            <a:avLst/>
+          </a:prstGeom>
+        </p:spPr>
+        <p:txBody>
+          <a:bodyPr spcFirstLastPara="1" wrap="square" lIns="91425" tIns="91425" rIns="91425" bIns="91425" anchor="t" anchorCtr="0">
+            <a:noAutofit/>
+          </a:bodyPr>
+          <a:lstStyle/>
+          <a:p>
+            <a:pPr marL="0" lvl="0" indent="0" algn="l" rtl="0">
+              <a:spcBef>
+                <a:spcPts val="0"/>
+              </a:spcBef>
+              <a:spcAft>
+                <a:spcPts val="0"/>
+              </a:spcAft>
+              <a:buClr>
+                <a:schemeClr val="dk1"/>
+              </a:buClr>
+              <a:buSzPts val="1100"/>
+              <a:buFont typeface="Arial"/>
+              <a:buNone/>
+            </a:pPr>
+            <a:r>
+              <a:rPr lang="en"/>
+              <a:t>Your version control evidence should go here.  This could be in the form of annotated screenshots which show you you managed this process or you could make a brief screencast explaining how you implemented version control.</a:t>
+            </a:r>
+            <a:endParaRPr/>
+          </a:p>
+          <a:p>
+            <a:pPr marL="0" lvl="0" indent="0" algn="l" rtl="0">
+              <a:spcBef>
+                <a:spcPts val="0"/>
+              </a:spcBef>
+              <a:spcAft>
+                <a:spcPts val="0"/>
+              </a:spcAft>
+              <a:buNone/>
+            </a:pPr>
+            <a:endParaRPr/>
+          </a:p>
+        </p:txBody>
+      </p:sp>
+    </p:spTree>
+    <p:extLst>
+      <p:ext uri="{BB962C8B-B14F-4D97-AF65-F5344CB8AC3E}">
+        <p14:creationId xmlns:p14="http://schemas.microsoft.com/office/powerpoint/2010/main" val="511959585"/>
+      </p:ext>
+    </p:extLst>
+  </p:cSld>
+  <p:clrMapOvr>
+    <a:masterClrMapping/>
+  </p:clrMapOvr>
+</p:notes>
+</file>
+
+<file path=ppt/notesSlides/notesSlide21.xml><?xml version="1.0" encoding="utf-8"?>
+<p:notes xmlns:a="http://schemas.openxmlformats.org/drawingml/2006/main" xmlns:r="http://schemas.openxmlformats.org/officeDocument/2006/relationships" xmlns:p="http://schemas.openxmlformats.org/presentationml/2006/main" showMasterSp="0" showMasterPhAnim="0">
+  <p:cSld>
+    <p:spTree>
+      <p:nvGrpSpPr>
+        <p:cNvPr id="1" name="Shape 80"/>
+        <p:cNvGrpSpPr/>
+        <p:nvPr/>
+      </p:nvGrpSpPr>
+      <p:grpSpPr>
+        <a:xfrm>
+          <a:off x="0" y="0"/>
+          <a:ext cx="0" cy="0"/>
+          <a:chOff x="0" y="0"/>
+          <a:chExt cx="0" cy="0"/>
+        </a:xfrm>
+      </p:grpSpPr>
+      <p:sp>
+        <p:nvSpPr>
+          <p:cNvPr id="81" name="Google Shape;81;gac10fef634_0_25:notes"/>
+          <p:cNvSpPr>
+            <a:spLocks noGrp="1" noRot="1" noChangeAspect="1"/>
+          </p:cNvSpPr>
+          <p:nvPr>
+            <p:ph type="sldImg" idx="2"/>
+          </p:nvPr>
+        </p:nvSpPr>
+        <p:spPr>
+          <a:xfrm>
+            <a:off x="381000" y="685800"/>
+            <a:ext cx="6096000" cy="3429000"/>
+          </a:xfrm>
+          <a:custGeom>
+            <a:avLst/>
+            <a:gdLst/>
+            <a:ahLst/>
+            <a:cxnLst/>
+            <a:rect l="l" t="t" r="r" b="b"/>
+            <a:pathLst>
+              <a:path w="120000" h="120000" extrusionOk="0">
+                <a:moveTo>
+                  <a:pt x="0" y="0"/>
+                </a:moveTo>
+                <a:lnTo>
+                  <a:pt x="120000" y="0"/>
+                </a:lnTo>
+                <a:lnTo>
+                  <a:pt x="120000" y="120000"/>
+                </a:lnTo>
+                <a:lnTo>
+                  <a:pt x="0" y="120000"/>
+                </a:lnTo>
+                <a:close/>
+              </a:path>
+            </a:pathLst>
+          </a:custGeom>
+        </p:spPr>
+      </p:sp>
+      <p:sp>
+        <p:nvSpPr>
+          <p:cNvPr id="82" name="Google Shape;82;gac10fef634_0_25:notes"/>
+          <p:cNvSpPr txBox="1">
+            <a:spLocks noGrp="1"/>
+          </p:cNvSpPr>
+          <p:nvPr>
+            <p:ph type="body" idx="1"/>
+          </p:nvPr>
+        </p:nvSpPr>
+        <p:spPr>
+          <a:xfrm>
+            <a:off x="685800" y="4343400"/>
+            <a:ext cx="5486400" cy="4114800"/>
+          </a:xfrm>
+          <a:prstGeom prst="rect">
+            <a:avLst/>
+          </a:prstGeom>
+        </p:spPr>
+        <p:txBody>
+          <a:bodyPr spcFirstLastPara="1" wrap="square" lIns="91425" tIns="91425" rIns="91425" bIns="91425" anchor="t" anchorCtr="0">
+            <a:noAutofit/>
+          </a:bodyPr>
+          <a:lstStyle/>
+          <a:p>
+            <a:pPr marL="0" lvl="0" indent="0" algn="l" rtl="0">
+              <a:spcBef>
+                <a:spcPts val="0"/>
+              </a:spcBef>
+              <a:spcAft>
+                <a:spcPts val="0"/>
+              </a:spcAft>
+              <a:buClr>
+                <a:schemeClr val="dk1"/>
+              </a:buClr>
+              <a:buSzPts val="1100"/>
+              <a:buFont typeface="Arial"/>
+              <a:buNone/>
+            </a:pPr>
+            <a:r>
+              <a:rPr lang="en"/>
+              <a:t>Your version control evidence should go here.  This could be in the form of annotated screenshots which show you you managed this process or you could make a brief screencast explaining how you implemented version control.</a:t>
+            </a:r>
+            <a:endParaRPr/>
+          </a:p>
+          <a:p>
+            <a:pPr marL="0" lvl="0" indent="0" algn="l" rtl="0">
+              <a:spcBef>
+                <a:spcPts val="0"/>
+              </a:spcBef>
+              <a:spcAft>
+                <a:spcPts val="0"/>
+              </a:spcAft>
+              <a:buNone/>
+            </a:pPr>
+            <a:endParaRPr/>
+          </a:p>
+        </p:txBody>
+      </p:sp>
+    </p:spTree>
+    <p:extLst>
+      <p:ext uri="{BB962C8B-B14F-4D97-AF65-F5344CB8AC3E}">
+        <p14:creationId xmlns:p14="http://schemas.microsoft.com/office/powerpoint/2010/main" val="3815843750"/>
+      </p:ext>
+    </p:extLst>
+  </p:cSld>
+  <p:clrMapOvr>
+    <a:masterClrMapping/>
+  </p:clrMapOvr>
+</p:notes>
+</file>
+
+<file path=ppt/notesSlides/notesSlide22.xml><?xml version="1.0" encoding="utf-8"?>
 <p:notes xmlns:a="http://schemas.openxmlformats.org/drawingml/2006/main" xmlns:r="http://schemas.openxmlformats.org/officeDocument/2006/relationships" xmlns:p="http://schemas.openxmlformats.org/presentationml/2006/main" showMasterSp="0" showMasterPhAnim="0">
   <p:cSld>
     <p:spTree>
@@ -2838,6 +3180,115 @@
   <p:cSld>
     <p:spTree>
       <p:nvGrpSpPr>
+        <p:cNvPr id="1" name="Shape 69"/>
+        <p:cNvGrpSpPr/>
+        <p:nvPr/>
+      </p:nvGrpSpPr>
+      <p:grpSpPr>
+        <a:xfrm>
+          <a:off x="0" y="0"/>
+          <a:ext cx="0" cy="0"/>
+          <a:chOff x="0" y="0"/>
+          <a:chExt cx="0" cy="0"/>
+        </a:xfrm>
+      </p:grpSpPr>
+      <p:sp>
+        <p:nvSpPr>
+          <p:cNvPr id="70" name="Google Shape;70;gac10fef634_0_16:notes"/>
+          <p:cNvSpPr>
+            <a:spLocks noGrp="1" noRot="1" noChangeAspect="1"/>
+          </p:cNvSpPr>
+          <p:nvPr>
+            <p:ph type="sldImg" idx="2"/>
+          </p:nvPr>
+        </p:nvSpPr>
+        <p:spPr>
+          <a:xfrm>
+            <a:off x="381000" y="685800"/>
+            <a:ext cx="6096000" cy="3429000"/>
+          </a:xfrm>
+          <a:custGeom>
+            <a:avLst/>
+            <a:gdLst/>
+            <a:ahLst/>
+            <a:cxnLst/>
+            <a:rect l="l" t="t" r="r" b="b"/>
+            <a:pathLst>
+              <a:path w="120000" h="120000" extrusionOk="0">
+                <a:moveTo>
+                  <a:pt x="0" y="0"/>
+                </a:moveTo>
+                <a:lnTo>
+                  <a:pt x="120000" y="0"/>
+                </a:lnTo>
+                <a:lnTo>
+                  <a:pt x="120000" y="120000"/>
+                </a:lnTo>
+                <a:lnTo>
+                  <a:pt x="0" y="120000"/>
+                </a:lnTo>
+                <a:close/>
+              </a:path>
+            </a:pathLst>
+          </a:custGeom>
+        </p:spPr>
+      </p:sp>
+      <p:sp>
+        <p:nvSpPr>
+          <p:cNvPr id="71" name="Google Shape;71;gac10fef634_0_16:notes"/>
+          <p:cNvSpPr txBox="1">
+            <a:spLocks noGrp="1"/>
+          </p:cNvSpPr>
+          <p:nvPr>
+            <p:ph type="body" idx="1"/>
+          </p:nvPr>
+        </p:nvSpPr>
+        <p:spPr>
+          <a:xfrm>
+            <a:off x="685800" y="4343400"/>
+            <a:ext cx="5486400" cy="4114800"/>
+          </a:xfrm>
+          <a:prstGeom prst="rect">
+            <a:avLst/>
+          </a:prstGeom>
+        </p:spPr>
+        <p:txBody>
+          <a:bodyPr spcFirstLastPara="1" wrap="square" lIns="91425" tIns="91425" rIns="91425" bIns="91425" anchor="t" anchorCtr="0">
+            <a:noAutofit/>
+          </a:bodyPr>
+          <a:lstStyle/>
+          <a:p>
+            <a:pPr marL="0" lvl="0" indent="0" algn="l" rtl="0">
+              <a:spcBef>
+                <a:spcPts val="0"/>
+              </a:spcBef>
+              <a:spcAft>
+                <a:spcPts val="0"/>
+              </a:spcAft>
+              <a:buNone/>
+            </a:pPr>
+            <a:endParaRPr/>
+          </a:p>
+        </p:txBody>
+      </p:sp>
+    </p:spTree>
+    <p:extLst>
+      <p:ext uri="{BB962C8B-B14F-4D97-AF65-F5344CB8AC3E}">
+        <p14:creationId xmlns:p14="http://schemas.microsoft.com/office/powerpoint/2010/main" val="3134560856"/>
+      </p:ext>
+    </p:extLst>
+  </p:cSld>
+  <p:clrMapOvr>
+    <a:masterClrMapping/>
+  </p:clrMapOvr>
+</p:notes>
+</file>
+
+<file path=ppt/notesSlides/notesSlide9.xml><?xml version="1.0" encoding="utf-8"?>
+<p:notes xmlns:a="http://schemas.openxmlformats.org/drawingml/2006/main" xmlns:r="http://schemas.openxmlformats.org/officeDocument/2006/relationships" xmlns:p="http://schemas.openxmlformats.org/presentationml/2006/main" showMasterSp="0" showMasterPhAnim="0">
+  <p:cSld>
+    <p:spTree>
+      <p:nvGrpSpPr>
         <p:cNvPr id="1" name="Shape 74"/>
         <p:cNvGrpSpPr/>
         <p:nvPr/>
@@ -2933,115 +3384,6 @@
     <p:extLst>
       <p:ext uri="{BB962C8B-B14F-4D97-AF65-F5344CB8AC3E}">
         <p14:creationId xmlns:p14="http://schemas.microsoft.com/office/powerpoint/2010/main" val="3390339999"/>
-      </p:ext>
-    </p:extLst>
-  </p:cSld>
-  <p:clrMapOvr>
-    <a:masterClrMapping/>
-  </p:clrMapOvr>
-</p:notes>
-</file>
-
-<file path=ppt/notesSlides/notesSlide9.xml><?xml version="1.0" encoding="utf-8"?>
-<p:notes xmlns:a="http://schemas.openxmlformats.org/drawingml/2006/main" xmlns:r="http://schemas.openxmlformats.org/officeDocument/2006/relationships" xmlns:p="http://schemas.openxmlformats.org/presentationml/2006/main" showMasterSp="0" showMasterPhAnim="0">
-  <p:cSld>
-    <p:spTree>
-      <p:nvGrpSpPr>
-        <p:cNvPr id="1" name="Shape 69"/>
-        <p:cNvGrpSpPr/>
-        <p:nvPr/>
-      </p:nvGrpSpPr>
-      <p:grpSpPr>
-        <a:xfrm>
-          <a:off x="0" y="0"/>
-          <a:ext cx="0" cy="0"/>
-          <a:chOff x="0" y="0"/>
-          <a:chExt cx="0" cy="0"/>
-        </a:xfrm>
-      </p:grpSpPr>
-      <p:sp>
-        <p:nvSpPr>
-          <p:cNvPr id="70" name="Google Shape;70;gac10fef634_0_16:notes"/>
-          <p:cNvSpPr>
-            <a:spLocks noGrp="1" noRot="1" noChangeAspect="1"/>
-          </p:cNvSpPr>
-          <p:nvPr>
-            <p:ph type="sldImg" idx="2"/>
-          </p:nvPr>
-        </p:nvSpPr>
-        <p:spPr>
-          <a:xfrm>
-            <a:off x="381000" y="685800"/>
-            <a:ext cx="6096000" cy="3429000"/>
-          </a:xfrm>
-          <a:custGeom>
-            <a:avLst/>
-            <a:gdLst/>
-            <a:ahLst/>
-            <a:cxnLst/>
-            <a:rect l="l" t="t" r="r" b="b"/>
-            <a:pathLst>
-              <a:path w="120000" h="120000" extrusionOk="0">
-                <a:moveTo>
-                  <a:pt x="0" y="0"/>
-                </a:moveTo>
-                <a:lnTo>
-                  <a:pt x="120000" y="0"/>
-                </a:lnTo>
-                <a:lnTo>
-                  <a:pt x="120000" y="120000"/>
-                </a:lnTo>
-                <a:lnTo>
-                  <a:pt x="0" y="120000"/>
-                </a:lnTo>
-                <a:close/>
-              </a:path>
-            </a:pathLst>
-          </a:custGeom>
-        </p:spPr>
-      </p:sp>
-      <p:sp>
-        <p:nvSpPr>
-          <p:cNvPr id="71" name="Google Shape;71;gac10fef634_0_16:notes"/>
-          <p:cNvSpPr txBox="1">
-            <a:spLocks noGrp="1"/>
-          </p:cNvSpPr>
-          <p:nvPr>
-            <p:ph type="body" idx="1"/>
-          </p:nvPr>
-        </p:nvSpPr>
-        <p:spPr>
-          <a:xfrm>
-            <a:off x="685800" y="4343400"/>
-            <a:ext cx="5486400" cy="4114800"/>
-          </a:xfrm>
-          <a:prstGeom prst="rect">
-            <a:avLst/>
-          </a:prstGeom>
-        </p:spPr>
-        <p:txBody>
-          <a:bodyPr spcFirstLastPara="1" wrap="square" lIns="91425" tIns="91425" rIns="91425" bIns="91425" anchor="t" anchorCtr="0">
-            <a:noAutofit/>
-          </a:bodyPr>
-          <a:lstStyle/>
-          <a:p>
-            <a:pPr marL="0" lvl="0" indent="0" algn="l" rtl="0">
-              <a:spcBef>
-                <a:spcPts val="0"/>
-              </a:spcBef>
-              <a:spcAft>
-                <a:spcPts val="0"/>
-              </a:spcAft>
-              <a:buNone/>
-            </a:pPr>
-            <a:endParaRPr/>
-          </a:p>
-        </p:txBody>
-      </p:sp>
-    </p:spTree>
-    <p:extLst>
-      <p:ext uri="{BB962C8B-B14F-4D97-AF65-F5344CB8AC3E}">
-        <p14:creationId xmlns:p14="http://schemas.microsoft.com/office/powerpoint/2010/main" val="3145666181"/>
       </p:ext>
     </p:extLst>
   </p:cSld>
@@ -9789,12 +10131,42 @@
             </a:pPr>
             <a:r>
               <a:rPr lang="en" dirty="0"/>
-              <a:t>Component 2 (Trello screenshot)</a:t>
+              <a:t>Component 2 Delivery/ click and collect Menu (Trello screenshot)</a:t>
             </a:r>
             <a:endParaRPr dirty="0"/>
           </a:p>
         </p:txBody>
       </p:sp>
+      <p:pic>
+        <p:nvPicPr>
+          <p:cNvPr id="3" name="Picture 2">
+            <a:extLst>
+              <a:ext uri="{FF2B5EF4-FFF2-40B4-BE49-F238E27FC236}">
+                <a16:creationId xmlns:a16="http://schemas.microsoft.com/office/drawing/2014/main" id="{4DB4DFF6-2AA9-D86D-6BE0-C1CFA6A90862}"/>
+              </a:ext>
+            </a:extLst>
+          </p:cNvPr>
+          <p:cNvPicPr>
+            <a:picLocks noChangeAspect="1"/>
+          </p:cNvPicPr>
+          <p:nvPr/>
+        </p:nvPicPr>
+        <p:blipFill>
+          <a:blip r:embed="rId3"/>
+          <a:stretch>
+            <a:fillRect/>
+          </a:stretch>
+        </p:blipFill>
+        <p:spPr>
+          <a:xfrm>
+            <a:off x="311700" y="1531238"/>
+            <a:ext cx="8335780" cy="2505667"/>
+          </a:xfrm>
+          <a:prstGeom prst="rect">
+            <a:avLst/>
+          </a:prstGeom>
+        </p:spPr>
+      </p:pic>
     </p:spTree>
     <p:extLst>
       <p:ext uri="{BB962C8B-B14F-4D97-AF65-F5344CB8AC3E}">
@@ -9809,6 +10181,116 @@
 </file>
 
 <file path=ppt/slides/slide21.xml><?xml version="1.0" encoding="utf-8"?>
+<p:sld xmlns:a="http://schemas.openxmlformats.org/drawingml/2006/main" xmlns:r="http://schemas.openxmlformats.org/officeDocument/2006/relationships" xmlns:p="http://schemas.openxmlformats.org/presentationml/2006/main">
+  <p:cSld>
+    <p:bg>
+      <p:bgPr>
+        <a:solidFill>
+          <a:srgbClr val="D9EAD3"/>
+        </a:solidFill>
+        <a:effectLst/>
+      </p:bgPr>
+    </p:bg>
+    <p:spTree>
+      <p:nvGrpSpPr>
+        <p:cNvPr id="1" name="Shape 72"/>
+        <p:cNvGrpSpPr/>
+        <p:nvPr/>
+      </p:nvGrpSpPr>
+      <p:grpSpPr>
+        <a:xfrm>
+          <a:off x="0" y="0"/>
+          <a:ext cx="0" cy="0"/>
+          <a:chOff x="0" y="0"/>
+          <a:chExt cx="0" cy="0"/>
+        </a:xfrm>
+      </p:grpSpPr>
+      <p:sp>
+        <p:nvSpPr>
+          <p:cNvPr id="73" name="Google Shape;73;p16"/>
+          <p:cNvSpPr txBox="1">
+            <a:spLocks noGrp="1"/>
+          </p:cNvSpPr>
+          <p:nvPr>
+            <p:ph type="title"/>
+          </p:nvPr>
+        </p:nvSpPr>
+        <p:spPr>
+          <a:xfrm>
+            <a:off x="311700" y="445025"/>
+            <a:ext cx="8520600" cy="572700"/>
+          </a:xfrm>
+          <a:prstGeom prst="rect">
+            <a:avLst/>
+          </a:prstGeom>
+        </p:spPr>
+        <p:txBody>
+          <a:bodyPr spcFirstLastPara="1" wrap="square" lIns="91425" tIns="91425" rIns="91425" bIns="91425" anchor="t" anchorCtr="0">
+            <a:noAutofit/>
+          </a:bodyPr>
+          <a:lstStyle/>
+          <a:p>
+            <a:pPr marL="0" lvl="0" indent="0" algn="l" rtl="0">
+              <a:spcBef>
+                <a:spcPts val="0"/>
+              </a:spcBef>
+              <a:spcAft>
+                <a:spcPts val="0"/>
+              </a:spcAft>
+              <a:buNone/>
+            </a:pPr>
+            <a:r>
+              <a:rPr lang="en" dirty="0"/>
+              <a:t>Component 2 Delivery/ click and collect Menu v2</a:t>
+            </a:r>
+            <a:endParaRPr dirty="0"/>
+          </a:p>
+        </p:txBody>
+      </p:sp>
+      <p:pic>
+        <p:nvPicPr>
+          <p:cNvPr id="4" name="Picture 3">
+            <a:extLst>
+              <a:ext uri="{FF2B5EF4-FFF2-40B4-BE49-F238E27FC236}">
+                <a16:creationId xmlns:a16="http://schemas.microsoft.com/office/drawing/2014/main" id="{CF60C6C1-0AB0-E112-4EF5-CC80603B4BF0}"/>
+              </a:ext>
+            </a:extLst>
+          </p:cNvPr>
+          <p:cNvPicPr>
+            <a:picLocks noChangeAspect="1"/>
+          </p:cNvPicPr>
+          <p:nvPr/>
+        </p:nvPicPr>
+        <p:blipFill>
+          <a:blip r:embed="rId3"/>
+          <a:stretch>
+            <a:fillRect/>
+          </a:stretch>
+        </p:blipFill>
+        <p:spPr>
+          <a:xfrm>
+            <a:off x="622900" y="1128775"/>
+            <a:ext cx="8087854" cy="3658111"/>
+          </a:xfrm>
+          <a:prstGeom prst="rect">
+            <a:avLst/>
+          </a:prstGeom>
+        </p:spPr>
+      </p:pic>
+    </p:spTree>
+    <p:extLst>
+      <p:ext uri="{BB962C8B-B14F-4D97-AF65-F5344CB8AC3E}">
+        <p14:creationId xmlns:p14="http://schemas.microsoft.com/office/powerpoint/2010/main" val="1031046766"/>
+      </p:ext>
+    </p:extLst>
+  </p:cSld>
+  <p:clrMapOvr>
+    <a:masterClrMapping/>
+  </p:clrMapOvr>
+</p:sld>
+</file>
+
+<file path=ppt/slides/slide22.xml><?xml version="1.0" encoding="utf-8"?>
 <p:sld xmlns:a="http://schemas.openxmlformats.org/drawingml/2006/main" xmlns:r="http://schemas.openxmlformats.org/officeDocument/2006/relationships" xmlns:p="http://schemas.openxmlformats.org/presentationml/2006/main">
   <p:cSld>
     <p:spTree>
@@ -9861,7 +10343,7 @@
             </a:pPr>
             <a:r>
               <a:rPr lang="en" dirty="0"/>
-              <a:t>Component 2 - Test Plan (?and screenshot)</a:t>
+              <a:t>Component 2 - Test Plan v1(?and screenshot)</a:t>
             </a:r>
             <a:endParaRPr dirty="0"/>
           </a:p>
@@ -9871,11 +10353,17 @@
         <p:nvGraphicFramePr>
           <p:cNvPr id="79" name="Google Shape;79;p17"/>
           <p:cNvGraphicFramePr/>
-          <p:nvPr/>
+          <p:nvPr>
+            <p:extLst>
+              <p:ext uri="{D42A27DB-BD31-4B8C-83A1-F6EECF244321}">
+                <p14:modId xmlns:p14="http://schemas.microsoft.com/office/powerpoint/2010/main" val="2884583491"/>
+              </p:ext>
+            </p:extLst>
+          </p:nvPr>
         </p:nvGraphicFramePr>
         <p:xfrm>
-          <a:off x="382475" y="1267725"/>
-          <a:ext cx="8520600" cy="914340"/>
+          <a:off x="213142" y="3589080"/>
+          <a:ext cx="8520600" cy="1280100"/>
         </p:xfrm>
         <a:graphic>
           <a:graphicData uri="http://schemas.openxmlformats.org/drawingml/2006/table">
@@ -9976,10 +10464,308 @@
                         </a:spcAft>
                         <a:buNone/>
                       </a:pPr>
-                      <a:endParaRPr sz="1800"/>
+                      <a:r>
+                        <a:rPr lang="en-NZ" sz="1800" dirty="0"/>
+                        <a:t>Run Program</a:t>
+                      </a:r>
+                      <a:endParaRPr sz="1800" dirty="0"/>
                     </a:p>
                   </a:txBody>
                   <a:tcPr marL="91425" marR="91425" marT="91425" marB="91425"/>
+                </a:tc>
+                <a:tc>
+                  <a:txBody>
+                    <a:bodyPr/>
+                    <a:lstStyle/>
+                    <a:p>
+                      <a:pPr rtl="0" fontAlgn="base"/>
+                      <a:r>
+                        <a:rPr lang="en-NZ" sz="1400" b="0" i="0" u="none" strike="noStrike" cap="none" dirty="0">
+                          <a:solidFill>
+                            <a:srgbClr val="000000"/>
+                          </a:solidFill>
+                          <a:effectLst/>
+                          <a:latin typeface="Arial"/>
+                          <a:ea typeface="Arial"/>
+                          <a:cs typeface="Arial"/>
+                          <a:sym typeface="Arial"/>
+                        </a:rPr>
+                        <a:t>Enter c program prints pickup </a:t>
+                      </a:r>
+                      <a:r>
+                        <a:rPr lang="en-US" sz="1400" b="0" i="0" u="none" strike="noStrike" cap="none" dirty="0">
+                          <a:solidFill>
+                            <a:srgbClr val="000000"/>
+                          </a:solidFill>
+                          <a:effectLst/>
+                          <a:latin typeface="Arial"/>
+                          <a:ea typeface="Arial"/>
+                          <a:cs typeface="Arial"/>
+                          <a:sym typeface="Arial"/>
+                        </a:rPr>
+                        <a:t>​</a:t>
+                      </a:r>
+                    </a:p>
+                    <a:p>
+                      <a:pPr rtl="0" fontAlgn="base"/>
+                      <a:r>
+                        <a:rPr lang="en-NZ" sz="1400" b="0" i="0" u="none" strike="noStrike" cap="none" dirty="0">
+                          <a:solidFill>
+                            <a:srgbClr val="000000"/>
+                          </a:solidFill>
+                          <a:effectLst/>
+                          <a:latin typeface="Arial"/>
+                          <a:ea typeface="Arial"/>
+                          <a:cs typeface="Arial"/>
+                          <a:sym typeface="Arial"/>
+                        </a:rPr>
+                        <a:t>Enter d program prints delivery</a:t>
+                      </a:r>
+                      <a:r>
+                        <a:rPr lang="en-US" sz="1400" b="0" i="0" u="none" strike="noStrike" cap="none" dirty="0">
+                          <a:solidFill>
+                            <a:srgbClr val="000000"/>
+                          </a:solidFill>
+                          <a:effectLst/>
+                          <a:latin typeface="Arial"/>
+                          <a:ea typeface="Arial"/>
+                          <a:cs typeface="Arial"/>
+                          <a:sym typeface="Arial"/>
+                        </a:rPr>
+                        <a:t>​</a:t>
+                      </a:r>
+                    </a:p>
+                    <a:p>
+                      <a:pPr rtl="0" fontAlgn="base"/>
+                      <a:r>
+                        <a:rPr lang="en-NZ" sz="1400" b="0" i="0" u="none" strike="noStrike" cap="none" dirty="0">
+                          <a:solidFill>
+                            <a:srgbClr val="000000"/>
+                          </a:solidFill>
+                          <a:effectLst/>
+                          <a:latin typeface="Arial"/>
+                          <a:ea typeface="Arial"/>
+                          <a:cs typeface="Arial"/>
+                          <a:sym typeface="Arial"/>
+                        </a:rPr>
+                        <a:t>Enter invalid program stops</a:t>
+                      </a:r>
+                      <a:endParaRPr lang="en-US" sz="1400" b="0" i="0" u="none" strike="noStrike" cap="none" dirty="0">
+                        <a:solidFill>
+                          <a:srgbClr val="000000"/>
+                        </a:solidFill>
+                        <a:effectLst/>
+                        <a:latin typeface="Arial"/>
+                        <a:ea typeface="Arial"/>
+                        <a:cs typeface="Arial"/>
+                        <a:sym typeface="Arial"/>
+                      </a:endParaRPr>
+                    </a:p>
+                  </a:txBody>
+                  <a:tcPr marL="91425" marR="91425" marT="91425" marB="91425"/>
+                </a:tc>
+                <a:extLst>
+                  <a:ext uri="{0D108BD9-81ED-4DB2-BD59-A6C34878D82A}">
+                    <a16:rowId xmlns:a16="http://schemas.microsoft.com/office/drawing/2014/main" val="10001"/>
+                  </a:ext>
+                </a:extLst>
+              </a:tr>
+            </a:tbl>
+          </a:graphicData>
+        </a:graphic>
+      </p:graphicFrame>
+      <p:pic>
+        <p:nvPicPr>
+          <p:cNvPr id="3" name="Picture 2">
+            <a:extLst>
+              <a:ext uri="{FF2B5EF4-FFF2-40B4-BE49-F238E27FC236}">
+                <a16:creationId xmlns:a16="http://schemas.microsoft.com/office/drawing/2014/main" id="{A7198EF8-2B81-E035-3B18-820FB2C7A90F}"/>
+              </a:ext>
+            </a:extLst>
+          </p:cNvPr>
+          <p:cNvPicPr>
+            <a:picLocks noChangeAspect="1"/>
+          </p:cNvPicPr>
+          <p:nvPr/>
+        </p:nvPicPr>
+        <p:blipFill>
+          <a:blip r:embed="rId3"/>
+          <a:stretch>
+            <a:fillRect/>
+          </a:stretch>
+        </p:blipFill>
+        <p:spPr>
+          <a:xfrm>
+            <a:off x="4571999" y="1504495"/>
+            <a:ext cx="4416213" cy="1629511"/>
+          </a:xfrm>
+          <a:prstGeom prst="rect">
+            <a:avLst/>
+          </a:prstGeom>
+        </p:spPr>
+      </p:pic>
+      <p:pic>
+        <p:nvPicPr>
+          <p:cNvPr id="5" name="Picture 4">
+            <a:extLst>
+              <a:ext uri="{FF2B5EF4-FFF2-40B4-BE49-F238E27FC236}">
+                <a16:creationId xmlns:a16="http://schemas.microsoft.com/office/drawing/2014/main" id="{CFC09E8D-F2B6-7EF7-49EE-46E6FC408015}"/>
+              </a:ext>
+            </a:extLst>
+          </p:cNvPr>
+          <p:cNvPicPr>
+            <a:picLocks noChangeAspect="1"/>
+          </p:cNvPicPr>
+          <p:nvPr/>
+        </p:nvPicPr>
+        <p:blipFill>
+          <a:blip r:embed="rId4"/>
+          <a:stretch>
+            <a:fillRect/>
+          </a:stretch>
+        </p:blipFill>
+        <p:spPr>
+          <a:xfrm>
+            <a:off x="213141" y="1298341"/>
+            <a:ext cx="4182751" cy="2145822"/>
+          </a:xfrm>
+          <a:prstGeom prst="rect">
+            <a:avLst/>
+          </a:prstGeom>
+        </p:spPr>
+      </p:pic>
+    </p:spTree>
+    <p:extLst>
+      <p:ext uri="{BB962C8B-B14F-4D97-AF65-F5344CB8AC3E}">
+        <p14:creationId xmlns:p14="http://schemas.microsoft.com/office/powerpoint/2010/main" val="2116980625"/>
+      </p:ext>
+    </p:extLst>
+  </p:cSld>
+  <p:clrMapOvr>
+    <a:masterClrMapping/>
+  </p:clrMapOvr>
+</p:sld>
+</file>
+
+<file path=ppt/slides/slide23.xml><?xml version="1.0" encoding="utf-8"?>
+<p:sld xmlns:a="http://schemas.openxmlformats.org/drawingml/2006/main" xmlns:r="http://schemas.openxmlformats.org/officeDocument/2006/relationships" xmlns:p="http://schemas.openxmlformats.org/presentationml/2006/main">
+  <p:cSld>
+    <p:spTree>
+      <p:nvGrpSpPr>
+        <p:cNvPr id="1" name="Shape 77"/>
+        <p:cNvGrpSpPr/>
+        <p:nvPr/>
+      </p:nvGrpSpPr>
+      <p:grpSpPr>
+        <a:xfrm>
+          <a:off x="0" y="0"/>
+          <a:ext cx="0" cy="0"/>
+          <a:chOff x="0" y="0"/>
+          <a:chExt cx="0" cy="0"/>
+        </a:xfrm>
+      </p:grpSpPr>
+      <p:sp>
+        <p:nvSpPr>
+          <p:cNvPr id="78" name="Google Shape;78;p17"/>
+          <p:cNvSpPr txBox="1">
+            <a:spLocks noGrp="1"/>
+          </p:cNvSpPr>
+          <p:nvPr>
+            <p:ph type="title"/>
+          </p:nvPr>
+        </p:nvSpPr>
+        <p:spPr>
+          <a:xfrm>
+            <a:off x="311700" y="445025"/>
+            <a:ext cx="8520600" cy="572700"/>
+          </a:xfrm>
+          <a:prstGeom prst="rect">
+            <a:avLst/>
+          </a:prstGeom>
+        </p:spPr>
+        <p:txBody>
+          <a:bodyPr spcFirstLastPara="1" wrap="square" lIns="91425" tIns="91425" rIns="91425" bIns="91425" anchor="t" anchorCtr="0">
+            <a:noAutofit/>
+          </a:bodyPr>
+          <a:lstStyle/>
+          <a:p>
+            <a:pPr marL="0" lvl="0" indent="0" algn="l" rtl="0">
+              <a:spcBef>
+                <a:spcPts val="0"/>
+              </a:spcBef>
+              <a:spcAft>
+                <a:spcPts val="0"/>
+              </a:spcAft>
+              <a:buNone/>
+            </a:pPr>
+            <a:r>
+              <a:rPr lang="en" dirty="0"/>
+              <a:t>Component 2 - Test Plan v2(?and screenshot)</a:t>
+            </a:r>
+            <a:endParaRPr dirty="0"/>
+          </a:p>
+        </p:txBody>
+      </p:sp>
+      <p:graphicFrame>
+        <p:nvGraphicFramePr>
+          <p:cNvPr id="79" name="Google Shape;79;p17"/>
+          <p:cNvGraphicFramePr/>
+          <p:nvPr/>
+        </p:nvGraphicFramePr>
+        <p:xfrm>
+          <a:off x="213142" y="3589080"/>
+          <a:ext cx="8520600" cy="1280100"/>
+        </p:xfrm>
+        <a:graphic>
+          <a:graphicData uri="http://schemas.openxmlformats.org/drawingml/2006/table">
+            <a:tbl>
+              <a:tblPr>
+                <a:noFill/>
+                <a:tableStyleId>{E1099E06-0E6B-448D-9D27-60429F06E6F4}</a:tableStyleId>
+              </a:tblPr>
+              <a:tblGrid>
+                <a:gridCol w="4260300">
+                  <a:extLst>
+                    <a:ext uri="{9D8B030D-6E8A-4147-A177-3AD203B41FA5}">
+                      <a16:colId xmlns:a16="http://schemas.microsoft.com/office/drawing/2014/main" val="20000"/>
+                    </a:ext>
+                  </a:extLst>
+                </a:gridCol>
+                <a:gridCol w="4260300">
+                  <a:extLst>
+                    <a:ext uri="{9D8B030D-6E8A-4147-A177-3AD203B41FA5}">
+                      <a16:colId xmlns:a16="http://schemas.microsoft.com/office/drawing/2014/main" val="20001"/>
+                    </a:ext>
+                  </a:extLst>
+                </a:gridCol>
+              </a:tblGrid>
+              <a:tr h="381000">
+                <a:tc>
+                  <a:txBody>
+                    <a:bodyPr/>
+                    <a:lstStyle/>
+                    <a:p>
+                      <a:pPr marL="0" lvl="0" indent="0" algn="l" rtl="0">
+                        <a:spcBef>
+                          <a:spcPts val="0"/>
+                        </a:spcBef>
+                        <a:spcAft>
+                          <a:spcPts val="0"/>
+                        </a:spcAft>
+                        <a:buNone/>
+                      </a:pPr>
+                      <a:r>
+                        <a:rPr lang="en" sz="1800" b="1"/>
+                        <a:t>Test Case</a:t>
+                      </a:r>
+                      <a:endParaRPr sz="1800" b="1"/>
+                    </a:p>
+                  </a:txBody>
+                  <a:tcPr marL="91425" marR="91425" marT="91425" marB="91425">
+                    <a:solidFill>
+                      <a:srgbClr val="CCCCCC"/>
+                    </a:solidFill>
+                  </a:tcPr>
                 </a:tc>
                 <a:tc>
                   <a:txBody>
@@ -9995,7 +10781,136 @@
                         </a:spcAft>
                         <a:buNone/>
                       </a:pPr>
-                      <a:endParaRPr sz="1800"/>
+                      <a:r>
+                        <a:rPr lang="en" sz="1800" b="1"/>
+                        <a:t>Expected Values</a:t>
+                      </a:r>
+                      <a:endParaRPr sz="1800" b="1"/>
+                    </a:p>
+                  </a:txBody>
+                  <a:tcPr marL="91425" marR="91425" marT="91425" marB="91425">
+                    <a:solidFill>
+                      <a:srgbClr val="CCCCCC"/>
+                    </a:solidFill>
+                  </a:tcPr>
+                </a:tc>
+                <a:extLst>
+                  <a:ext uri="{0D108BD9-81ED-4DB2-BD59-A6C34878D82A}">
+                    <a16:rowId xmlns:a16="http://schemas.microsoft.com/office/drawing/2014/main" val="10000"/>
+                  </a:ext>
+                </a:extLst>
+              </a:tr>
+              <a:tr h="396200">
+                <a:tc>
+                  <a:txBody>
+                    <a:bodyPr/>
+                    <a:lstStyle/>
+                    <a:p>
+                      <a:pPr marL="0" lvl="0" indent="0" algn="l" rtl="0">
+                        <a:spcBef>
+                          <a:spcPts val="0"/>
+                        </a:spcBef>
+                        <a:spcAft>
+                          <a:spcPts val="0"/>
+                        </a:spcAft>
+                        <a:buNone/>
+                      </a:pPr>
+                      <a:r>
+                        <a:rPr lang="en-NZ" sz="1800" dirty="0"/>
+                        <a:t>Run Program</a:t>
+                      </a:r>
+                      <a:endParaRPr sz="1800" dirty="0"/>
+                    </a:p>
+                  </a:txBody>
+                  <a:tcPr marL="91425" marR="91425" marT="91425" marB="91425"/>
+                </a:tc>
+                <a:tc>
+                  <a:txBody>
+                    <a:bodyPr/>
+                    <a:lstStyle/>
+                    <a:p>
+                      <a:pPr rtl="0" fontAlgn="base"/>
+                      <a:r>
+                        <a:rPr lang="en-NZ" sz="1400" b="0" i="0" u="none" strike="noStrike" cap="none" dirty="0">
+                          <a:solidFill>
+                            <a:srgbClr val="000000"/>
+                          </a:solidFill>
+                          <a:effectLst/>
+                          <a:latin typeface="Arial"/>
+                          <a:ea typeface="Arial"/>
+                          <a:cs typeface="Arial"/>
+                          <a:sym typeface="Arial"/>
+                        </a:rPr>
+                        <a:t>Enter c program prints pickup </a:t>
+                      </a:r>
+                      <a:r>
+                        <a:rPr lang="en-US" sz="1400" b="0" i="0" u="none" strike="noStrike" cap="none" dirty="0">
+                          <a:solidFill>
+                            <a:srgbClr val="000000"/>
+                          </a:solidFill>
+                          <a:effectLst/>
+                          <a:latin typeface="Arial"/>
+                          <a:ea typeface="Arial"/>
+                          <a:cs typeface="Arial"/>
+                          <a:sym typeface="Arial"/>
+                        </a:rPr>
+                        <a:t>​</a:t>
+                      </a:r>
+                    </a:p>
+                    <a:p>
+                      <a:pPr rtl="0" fontAlgn="base"/>
+                      <a:r>
+                        <a:rPr lang="en-NZ" sz="1400" b="0" i="0" u="none" strike="noStrike" cap="none" dirty="0">
+                          <a:solidFill>
+                            <a:srgbClr val="000000"/>
+                          </a:solidFill>
+                          <a:effectLst/>
+                          <a:latin typeface="Arial"/>
+                          <a:ea typeface="Arial"/>
+                          <a:cs typeface="Arial"/>
+                          <a:sym typeface="Arial"/>
+                        </a:rPr>
+                        <a:t>Enter d program prints delivery</a:t>
+                      </a:r>
+                      <a:r>
+                        <a:rPr lang="en-US" sz="1400" b="0" i="0" u="none" strike="noStrike" cap="none" dirty="0">
+                          <a:solidFill>
+                            <a:srgbClr val="000000"/>
+                          </a:solidFill>
+                          <a:effectLst/>
+                          <a:latin typeface="Arial"/>
+                          <a:ea typeface="Arial"/>
+                          <a:cs typeface="Arial"/>
+                          <a:sym typeface="Arial"/>
+                        </a:rPr>
+                        <a:t>​</a:t>
+                      </a:r>
+                    </a:p>
+                    <a:p>
+                      <a:pPr rtl="0" fontAlgn="base"/>
+                      <a:r>
+                        <a:rPr lang="en-NZ" sz="1400" b="0" i="0" u="none" strike="noStrike" cap="none" dirty="0">
+                          <a:solidFill>
+                            <a:srgbClr val="000000"/>
+                          </a:solidFill>
+                          <a:effectLst/>
+                          <a:latin typeface="Arial"/>
+                          <a:ea typeface="Arial"/>
+                          <a:cs typeface="Arial"/>
+                          <a:sym typeface="Arial"/>
+                        </a:rPr>
+                        <a:t>Enter invalid program stops</a:t>
+                      </a:r>
+                      <a:endParaRPr lang="en-US" sz="1400" b="0" i="0" u="none" strike="noStrike" cap="none" dirty="0">
+                        <a:solidFill>
+                          <a:srgbClr val="000000"/>
+                        </a:solidFill>
+                        <a:effectLst/>
+                        <a:latin typeface="Arial"/>
+                        <a:ea typeface="Arial"/>
+                        <a:cs typeface="Arial"/>
+                        <a:sym typeface="Arial"/>
+                      </a:endParaRPr>
                     </a:p>
                   </a:txBody>
                   <a:tcPr marL="91425" marR="91425" marT="91425" marB="91425"/>
@@ -10013,7 +10928,7 @@
     </p:spTree>
     <p:extLst>
       <p:ext uri="{BB962C8B-B14F-4D97-AF65-F5344CB8AC3E}">
-        <p14:creationId xmlns:p14="http://schemas.microsoft.com/office/powerpoint/2010/main" val="2116980625"/>
+        <p14:creationId xmlns:p14="http://schemas.microsoft.com/office/powerpoint/2010/main" val="568505923"/>
       </p:ext>
     </p:extLst>
   </p:cSld>
@@ -10023,7 +10938,7 @@
 </p:sld>
 </file>
 
-<file path=ppt/slides/slide22.xml><?xml version="1.0" encoding="utf-8"?>
+<file path=ppt/slides/slide24.xml><?xml version="1.0" encoding="utf-8"?>
 <p:sld xmlns:a="http://schemas.openxmlformats.org/drawingml/2006/main" xmlns:r="http://schemas.openxmlformats.org/officeDocument/2006/relationships" xmlns:p="http://schemas.openxmlformats.org/presentationml/2006/main">
   <p:cSld>
     <p:bg>
@@ -10103,7 +11018,7 @@
 </p:sld>
 </file>
 
-<file path=ppt/slides/slide23.xml><?xml version="1.0" encoding="utf-8"?>
+<file path=ppt/slides/slide25.xml><?xml version="1.0" encoding="utf-8"?>
 <p:sld xmlns:a="http://schemas.openxmlformats.org/drawingml/2006/main" xmlns:r="http://schemas.openxmlformats.org/officeDocument/2006/relationships" xmlns:p="http://schemas.openxmlformats.org/presentationml/2006/main">
   <p:cSld>
     <p:spTree>
@@ -10318,7 +11233,7 @@
 </p:sld>
 </file>
 
-<file path=ppt/slides/slide24.xml><?xml version="1.0" encoding="utf-8"?>
+<file path=ppt/slides/slide26.xml><?xml version="1.0" encoding="utf-8"?>
 <p:sld xmlns:a="http://schemas.openxmlformats.org/drawingml/2006/main" xmlns:r="http://schemas.openxmlformats.org/officeDocument/2006/relationships" xmlns:p="http://schemas.openxmlformats.org/presentationml/2006/main">
   <p:cSld>
     <p:bg>
@@ -10398,7 +11313,7 @@
 </p:sld>
 </file>
 
-<file path=ppt/slides/slide25.xml><?xml version="1.0" encoding="utf-8"?>
+<file path=ppt/slides/slide27.xml><?xml version="1.0" encoding="utf-8"?>
 <p:sld xmlns:a="http://schemas.openxmlformats.org/drawingml/2006/main" xmlns:r="http://schemas.openxmlformats.org/officeDocument/2006/relationships" xmlns:p="http://schemas.openxmlformats.org/presentationml/2006/main">
   <p:cSld>
     <p:spTree>
@@ -10613,7 +11528,7 @@
 </p:sld>
 </file>
 
-<file path=ppt/slides/slide26.xml><?xml version="1.0" encoding="utf-8"?>
+<file path=ppt/slides/slide28.xml><?xml version="1.0" encoding="utf-8"?>
 <p:sld xmlns:a="http://schemas.openxmlformats.org/drawingml/2006/main" xmlns:r="http://schemas.openxmlformats.org/officeDocument/2006/relationships" xmlns:p="http://schemas.openxmlformats.org/presentationml/2006/main">
   <p:cSld>
     <p:bg>
@@ -10693,7 +11608,7 @@
 </p:sld>
 </file>
 
-<file path=ppt/slides/slide27.xml><?xml version="1.0" encoding="utf-8"?>
+<file path=ppt/slides/slide29.xml><?xml version="1.0" encoding="utf-8"?>
 <p:sld xmlns:a="http://schemas.openxmlformats.org/drawingml/2006/main" xmlns:r="http://schemas.openxmlformats.org/officeDocument/2006/relationships" xmlns:p="http://schemas.openxmlformats.org/presentationml/2006/main">
   <p:cSld>
     <p:spTree>
@@ -10908,7 +11823,100 @@
 </p:sld>
 </file>
 
-<file path=ppt/slides/slide28.xml><?xml version="1.0" encoding="utf-8"?>
+<file path=ppt/slides/slide3.xml><?xml version="1.0" encoding="utf-8"?>
+<p:sld xmlns:a="http://schemas.openxmlformats.org/drawingml/2006/main" xmlns:r="http://schemas.openxmlformats.org/officeDocument/2006/relationships" xmlns:p="http://schemas.openxmlformats.org/presentationml/2006/main">
+  <p:cSld>
+    <p:spTree>
+      <p:nvGrpSpPr>
+        <p:cNvPr id="1" name=""/>
+        <p:cNvGrpSpPr/>
+        <p:nvPr/>
+      </p:nvGrpSpPr>
+      <p:grpSpPr>
+        <a:xfrm>
+          <a:off x="0" y="0"/>
+          <a:ext cx="0" cy="0"/>
+          <a:chOff x="0" y="0"/>
+          <a:chExt cx="0" cy="0"/>
+        </a:xfrm>
+      </p:grpSpPr>
+      <p:sp>
+        <p:nvSpPr>
+          <p:cNvPr id="2" name="Title 1">
+            <a:extLst>
+              <a:ext uri="{FF2B5EF4-FFF2-40B4-BE49-F238E27FC236}">
+                <a16:creationId xmlns:a16="http://schemas.microsoft.com/office/drawing/2014/main" id="{01ECFC6D-1627-A6D4-6B9E-2DE3E54A2279}"/>
+              </a:ext>
+            </a:extLst>
+          </p:cNvPr>
+          <p:cNvSpPr>
+            <a:spLocks noGrp="1"/>
+          </p:cNvSpPr>
+          <p:nvPr>
+            <p:ph type="title"/>
+          </p:nvPr>
+        </p:nvSpPr>
+        <p:spPr>
+          <a:xfrm>
+            <a:off x="311700" y="283660"/>
+            <a:ext cx="8520600" cy="572700"/>
+          </a:xfrm>
+        </p:spPr>
+        <p:txBody>
+          <a:bodyPr/>
+          <a:lstStyle/>
+          <a:p>
+            <a:r>
+              <a:rPr lang="en-US" dirty="0"/>
+              <a:t> Decomposition 2 (Trello Screen Shot)</a:t>
+            </a:r>
+          </a:p>
+        </p:txBody>
+      </p:sp>
+      <p:pic>
+        <p:nvPicPr>
+          <p:cNvPr id="3" name="Picture 4" descr="Graphical user interface, application, Word&#10;&#10;Description automatically generated">
+            <a:extLst>
+              <a:ext uri="{FF2B5EF4-FFF2-40B4-BE49-F238E27FC236}">
+                <a16:creationId xmlns:a16="http://schemas.microsoft.com/office/drawing/2014/main" id="{CCB131B0-C6DC-952F-9E30-B355C0F888BB}"/>
+              </a:ext>
+            </a:extLst>
+          </p:cNvPr>
+          <p:cNvPicPr>
+            <a:picLocks noChangeAspect="1"/>
+          </p:cNvPicPr>
+          <p:nvPr/>
+        </p:nvPicPr>
+        <p:blipFill>
+          <a:blip r:embed="rId2"/>
+          <a:stretch>
+            <a:fillRect/>
+          </a:stretch>
+        </p:blipFill>
+        <p:spPr>
+          <a:xfrm>
+            <a:off x="1566583" y="855920"/>
+            <a:ext cx="6084793" cy="4137631"/>
+          </a:xfrm>
+          <a:prstGeom prst="rect">
+            <a:avLst/>
+          </a:prstGeom>
+        </p:spPr>
+      </p:pic>
+    </p:spTree>
+    <p:extLst>
+      <p:ext uri="{BB962C8B-B14F-4D97-AF65-F5344CB8AC3E}">
+        <p14:creationId xmlns:p14="http://schemas.microsoft.com/office/powerpoint/2010/main" val="3571800113"/>
+      </p:ext>
+    </p:extLst>
+  </p:cSld>
+  <p:clrMapOvr>
+    <a:masterClrMapping/>
+  </p:clrMapOvr>
+</p:sld>
+</file>
+
+<file path=ppt/slides/slide30.xml><?xml version="1.0" encoding="utf-8"?>
 <p:sld xmlns:a="http://schemas.openxmlformats.org/drawingml/2006/main" xmlns:r="http://schemas.openxmlformats.org/officeDocument/2006/relationships" xmlns:p="http://schemas.openxmlformats.org/presentationml/2006/main">
   <p:cSld>
     <p:bg>
@@ -10988,7 +11996,7 @@
 </p:sld>
 </file>
 
-<file path=ppt/slides/slide29.xml><?xml version="1.0" encoding="utf-8"?>
+<file path=ppt/slides/slide31.xml><?xml version="1.0" encoding="utf-8"?>
 <p:sld xmlns:a="http://schemas.openxmlformats.org/drawingml/2006/main" xmlns:r="http://schemas.openxmlformats.org/officeDocument/2006/relationships" xmlns:p="http://schemas.openxmlformats.org/presentationml/2006/main">
   <p:cSld>
     <p:spTree>
@@ -11203,318 +12211,6 @@
 </p:sld>
 </file>
 
-<file path=ppt/slides/slide3.xml><?xml version="1.0" encoding="utf-8"?>
-<p:sld xmlns:a="http://schemas.openxmlformats.org/drawingml/2006/main" xmlns:r="http://schemas.openxmlformats.org/officeDocument/2006/relationships" xmlns:p="http://schemas.openxmlformats.org/presentationml/2006/main">
-  <p:cSld>
-    <p:spTree>
-      <p:nvGrpSpPr>
-        <p:cNvPr id="1" name=""/>
-        <p:cNvGrpSpPr/>
-        <p:nvPr/>
-      </p:nvGrpSpPr>
-      <p:grpSpPr>
-        <a:xfrm>
-          <a:off x="0" y="0"/>
-          <a:ext cx="0" cy="0"/>
-          <a:chOff x="0" y="0"/>
-          <a:chExt cx="0" cy="0"/>
-        </a:xfrm>
-      </p:grpSpPr>
-      <p:sp>
-        <p:nvSpPr>
-          <p:cNvPr id="2" name="Title 1">
-            <a:extLst>
-              <a:ext uri="{FF2B5EF4-FFF2-40B4-BE49-F238E27FC236}">
-                <a16:creationId xmlns:a16="http://schemas.microsoft.com/office/drawing/2014/main" id="{01ECFC6D-1627-A6D4-6B9E-2DE3E54A2279}"/>
-              </a:ext>
-            </a:extLst>
-          </p:cNvPr>
-          <p:cNvSpPr>
-            <a:spLocks noGrp="1"/>
-          </p:cNvSpPr>
-          <p:nvPr>
-            <p:ph type="title"/>
-          </p:nvPr>
-        </p:nvSpPr>
-        <p:spPr>
-          <a:xfrm>
-            <a:off x="311700" y="283660"/>
-            <a:ext cx="8520600" cy="572700"/>
-          </a:xfrm>
-        </p:spPr>
-        <p:txBody>
-          <a:bodyPr/>
-          <a:lstStyle/>
-          <a:p>
-            <a:r>
-              <a:rPr lang="en-US" dirty="0"/>
-              <a:t> Decomposition 2 (Trello Screen Shot)</a:t>
-            </a:r>
-          </a:p>
-        </p:txBody>
-      </p:sp>
-      <p:pic>
-        <p:nvPicPr>
-          <p:cNvPr id="3" name="Picture 4" descr="Graphical user interface, application, Word&#10;&#10;Description automatically generated">
-            <a:extLst>
-              <a:ext uri="{FF2B5EF4-FFF2-40B4-BE49-F238E27FC236}">
-                <a16:creationId xmlns:a16="http://schemas.microsoft.com/office/drawing/2014/main" id="{CCB131B0-C6DC-952F-9E30-B355C0F888BB}"/>
-              </a:ext>
-            </a:extLst>
-          </p:cNvPr>
-          <p:cNvPicPr>
-            <a:picLocks noChangeAspect="1"/>
-          </p:cNvPicPr>
-          <p:nvPr/>
-        </p:nvPicPr>
-        <p:blipFill>
-          <a:blip r:embed="rId2"/>
-          <a:stretch>
-            <a:fillRect/>
-          </a:stretch>
-        </p:blipFill>
-        <p:spPr>
-          <a:xfrm>
-            <a:off x="1566583" y="855920"/>
-            <a:ext cx="6084793" cy="4137631"/>
-          </a:xfrm>
-          <a:prstGeom prst="rect">
-            <a:avLst/>
-          </a:prstGeom>
-        </p:spPr>
-      </p:pic>
-    </p:spTree>
-    <p:extLst>
-      <p:ext uri="{BB962C8B-B14F-4D97-AF65-F5344CB8AC3E}">
-        <p14:creationId xmlns:p14="http://schemas.microsoft.com/office/powerpoint/2010/main" val="3571800113"/>
-      </p:ext>
-    </p:extLst>
-  </p:cSld>
-  <p:clrMapOvr>
-    <a:masterClrMapping/>
-  </p:clrMapOvr>
-</p:sld>
-</file>
-
-<file path=ppt/slides/slide30.xml><?xml version="1.0" encoding="utf-8"?>
-<p:sld xmlns:a="http://schemas.openxmlformats.org/drawingml/2006/main" xmlns:r="http://schemas.openxmlformats.org/officeDocument/2006/relationships" xmlns:p="http://schemas.openxmlformats.org/presentationml/2006/main">
-  <p:cSld>
-    <p:bg>
-      <p:bgPr>
-        <a:solidFill>
-          <a:schemeClr val="accent1">
-            <a:lumMod val="40000"/>
-            <a:lumOff val="60000"/>
-          </a:schemeClr>
-        </a:solidFill>
-        <a:effectLst/>
-      </p:bgPr>
-    </p:bg>
-    <p:spTree>
-      <p:nvGrpSpPr>
-        <p:cNvPr id="1" name=""/>
-        <p:cNvGrpSpPr/>
-        <p:nvPr/>
-      </p:nvGrpSpPr>
-      <p:grpSpPr>
-        <a:xfrm>
-          <a:off x="0" y="0"/>
-          <a:ext cx="0" cy="0"/>
-          <a:chOff x="0" y="0"/>
-          <a:chExt cx="0" cy="0"/>
-        </a:xfrm>
-      </p:grpSpPr>
-      <p:sp>
-        <p:nvSpPr>
-          <p:cNvPr id="2" name="Title 1">
-            <a:extLst>
-              <a:ext uri="{FF2B5EF4-FFF2-40B4-BE49-F238E27FC236}">
-                <a16:creationId xmlns:a16="http://schemas.microsoft.com/office/drawing/2014/main" id="{A5C911E6-3C3A-4332-8ACE-3B722DAE8165}"/>
-              </a:ext>
-            </a:extLst>
-          </p:cNvPr>
-          <p:cNvSpPr>
-            <a:spLocks noGrp="1"/>
-          </p:cNvSpPr>
-          <p:nvPr>
-            <p:ph type="title"/>
-          </p:nvPr>
-        </p:nvSpPr>
-        <p:spPr/>
-        <p:txBody>
-          <a:bodyPr/>
-          <a:lstStyle/>
-          <a:p>
-            <a:r>
-              <a:rPr lang="en-US" dirty="0"/>
-              <a:t>Version Control Section Section</a:t>
-            </a:r>
-            <a:endParaRPr lang="en-NZ" dirty="0"/>
-          </a:p>
-        </p:txBody>
-      </p:sp>
-      <p:sp>
-        <p:nvSpPr>
-          <p:cNvPr id="3" name="Text Placeholder 2">
-            <a:extLst>
-              <a:ext uri="{FF2B5EF4-FFF2-40B4-BE49-F238E27FC236}">
-                <a16:creationId xmlns:a16="http://schemas.microsoft.com/office/drawing/2014/main" id="{E4BDDDBC-7BAC-45B1-A8EA-6098ACA6CFE7}"/>
-              </a:ext>
-            </a:extLst>
-          </p:cNvPr>
-          <p:cNvSpPr>
-            <a:spLocks noGrp="1"/>
-          </p:cNvSpPr>
-          <p:nvPr>
-            <p:ph type="body" idx="1"/>
-          </p:nvPr>
-        </p:nvSpPr>
-        <p:spPr/>
-        <p:txBody>
-          <a:bodyPr/>
-          <a:lstStyle/>
-          <a:p>
-            <a:pPr marL="114300" indent="0">
-              <a:buNone/>
-            </a:pPr>
-            <a:r>
-              <a:rPr lang="en-US" dirty="0"/>
-              <a:t>Duplicate Slides if required – Show screenshot of GitHub commits and comments</a:t>
-            </a:r>
-            <a:endParaRPr lang="en-NZ" dirty="0"/>
-          </a:p>
-        </p:txBody>
-      </p:sp>
-    </p:spTree>
-    <p:extLst>
-      <p:ext uri="{BB962C8B-B14F-4D97-AF65-F5344CB8AC3E}">
-        <p14:creationId xmlns:p14="http://schemas.microsoft.com/office/powerpoint/2010/main" val="1738722987"/>
-      </p:ext>
-    </p:extLst>
-  </p:cSld>
-  <p:clrMapOvr>
-    <a:masterClrMapping/>
-  </p:clrMapOvr>
-</p:sld>
-</file>
-
-<file path=ppt/slides/slide31.xml><?xml version="1.0" encoding="utf-8"?>
-<p:sld xmlns:a="http://schemas.openxmlformats.org/drawingml/2006/main" xmlns:r="http://schemas.openxmlformats.org/officeDocument/2006/relationships" xmlns:p="http://schemas.openxmlformats.org/presentationml/2006/main">
-  <p:cSld>
-    <p:bg>
-      <p:bgPr>
-        <a:solidFill>
-          <a:srgbClr val="D9EAD3"/>
-        </a:solidFill>
-        <a:effectLst/>
-      </p:bgPr>
-    </p:bg>
-    <p:spTree>
-      <p:nvGrpSpPr>
-        <p:cNvPr id="1" name="Shape 83"/>
-        <p:cNvGrpSpPr/>
-        <p:nvPr/>
-      </p:nvGrpSpPr>
-      <p:grpSpPr>
-        <a:xfrm>
-          <a:off x="0" y="0"/>
-          <a:ext cx="0" cy="0"/>
-          <a:chOff x="0" y="0"/>
-          <a:chExt cx="0" cy="0"/>
-        </a:xfrm>
-      </p:grpSpPr>
-      <p:sp>
-        <p:nvSpPr>
-          <p:cNvPr id="84" name="Google Shape;84;p18"/>
-          <p:cNvSpPr txBox="1">
-            <a:spLocks noGrp="1"/>
-          </p:cNvSpPr>
-          <p:nvPr>
-            <p:ph type="title"/>
-          </p:nvPr>
-        </p:nvSpPr>
-        <p:spPr>
-          <a:xfrm>
-            <a:off x="311700" y="445025"/>
-            <a:ext cx="8520600" cy="572700"/>
-          </a:xfrm>
-          <a:prstGeom prst="rect">
-            <a:avLst/>
-          </a:prstGeom>
-        </p:spPr>
-        <p:txBody>
-          <a:bodyPr spcFirstLastPara="1" wrap="square" lIns="91425" tIns="91425" rIns="91425" bIns="91425" anchor="t" anchorCtr="0">
-            <a:noAutofit/>
-          </a:bodyPr>
-          <a:lstStyle/>
-          <a:p>
-            <a:pPr marL="0" lvl="0" indent="0" algn="l" rtl="0">
-              <a:spcBef>
-                <a:spcPts val="0"/>
-              </a:spcBef>
-              <a:spcAft>
-                <a:spcPts val="0"/>
-              </a:spcAft>
-              <a:buNone/>
-            </a:pPr>
-            <a:r>
-              <a:rPr lang="en"/>
-              <a:t>Version Control Evidence</a:t>
-            </a:r>
-            <a:endParaRPr/>
-          </a:p>
-        </p:txBody>
-      </p:sp>
-      <p:sp>
-        <p:nvSpPr>
-          <p:cNvPr id="85" name="Google Shape;85;p18"/>
-          <p:cNvSpPr txBox="1">
-            <a:spLocks noGrp="1"/>
-          </p:cNvSpPr>
-          <p:nvPr>
-            <p:ph type="body" idx="1"/>
-          </p:nvPr>
-        </p:nvSpPr>
-        <p:spPr>
-          <a:xfrm>
-            <a:off x="311700" y="1152475"/>
-            <a:ext cx="8464200" cy="3739200"/>
-          </a:xfrm>
-          <a:prstGeom prst="rect">
-            <a:avLst/>
-          </a:prstGeom>
-        </p:spPr>
-        <p:txBody>
-          <a:bodyPr spcFirstLastPara="1" wrap="square" lIns="91425" tIns="91425" rIns="91425" bIns="91425" anchor="t" anchorCtr="0">
-            <a:noAutofit/>
-          </a:bodyPr>
-          <a:lstStyle/>
-          <a:p>
-            <a:pPr marL="0" lvl="0" indent="0" algn="l" rtl="0">
-              <a:spcBef>
-                <a:spcPts val="0"/>
-              </a:spcBef>
-              <a:spcAft>
-                <a:spcPts val="1600"/>
-              </a:spcAft>
-              <a:buNone/>
-            </a:pPr>
-            <a:r>
-              <a:rPr lang="en" i="1"/>
-              <a:t>Your version control evidence should go here.  This could be in the form of annotated screenshots which show you you managed this process or you could make a brief screencast explaining how you implemented version control.</a:t>
-            </a:r>
-            <a:endParaRPr i="1"/>
-          </a:p>
-        </p:txBody>
-      </p:sp>
-    </p:spTree>
-  </p:cSld>
-  <p:clrMapOvr>
-    <a:masterClrMapping/>
-  </p:clrMapOvr>
-</p:sld>
-</file>
-
 <file path=ppt/slides/slide32.xml><?xml version="1.0" encoding="utf-8"?>
 <p:sld xmlns:a="http://schemas.openxmlformats.org/drawingml/2006/main" xmlns:r="http://schemas.openxmlformats.org/officeDocument/2006/relationships" xmlns:p="http://schemas.openxmlformats.org/presentationml/2006/main">
   <p:cSld>
@@ -11566,11 +12262,7 @@
           <a:p>
             <a:r>
               <a:rPr lang="en-US" dirty="0"/>
-              <a:t>Python Code </a:t>
-            </a:r>
-            <a:r>
-              <a:rPr lang="en-US" dirty="0" err="1"/>
-              <a:t>Coventions</a:t>
+              <a:t>Version Control Section Section</a:t>
             </a:r>
             <a:endParaRPr lang="en-NZ" dirty="0"/>
           </a:p>
@@ -11602,7 +12294,7 @@
             </a:pPr>
             <a:r>
               <a:rPr lang="en-US" dirty="0"/>
-              <a:t>Show screenshot of PEP8 testing both before and after.</a:t>
+              <a:t>Duplicate Slides if required – Show screenshot of GitHub commits and comments</a:t>
             </a:r>
             <a:endParaRPr lang="en-NZ" dirty="0"/>
           </a:p>
@@ -11611,7 +12303,7 @@
     </p:spTree>
     <p:extLst>
       <p:ext uri="{BB962C8B-B14F-4D97-AF65-F5344CB8AC3E}">
-        <p14:creationId xmlns:p14="http://schemas.microsoft.com/office/powerpoint/2010/main" val="1602139299"/>
+        <p14:creationId xmlns:p14="http://schemas.microsoft.com/office/powerpoint/2010/main" val="1738722987"/>
       </p:ext>
     </p:extLst>
   </p:cSld>
@@ -11681,10 +12373,10 @@
               <a:buNone/>
             </a:pPr>
             <a:r>
-              <a:rPr lang="en-NZ" dirty="0"/>
-              <a:t>Python convention testing (PEP8)</a:t>
+              <a:rPr lang="en"/>
+              <a:t>Version Control Evidence</a:t>
             </a:r>
-            <a:endParaRPr dirty="0"/>
+            <a:endParaRPr/>
           </a:p>
         </p:txBody>
       </p:sp>
@@ -11723,17 +12415,118 @@
               <a:buNone/>
             </a:pPr>
             <a:r>
-              <a:rPr lang="en-NZ" i="1" dirty="0"/>
-              <a:t>Screenshot of errors</a:t>
+              <a:rPr lang="en" i="1"/>
+              <a:t>Your version control evidence should go here.  This could be in the form of annotated screenshots which show you you managed this process or you could make a brief screencast explaining how you implemented version control.</a:t>
             </a:r>
-            <a:endParaRPr i="1" dirty="0"/>
+            <a:endParaRPr i="1"/>
+          </a:p>
+        </p:txBody>
+      </p:sp>
+    </p:spTree>
+  </p:cSld>
+  <p:clrMapOvr>
+    <a:masterClrMapping/>
+  </p:clrMapOvr>
+</p:sld>
+</file>
+
+<file path=ppt/slides/slide34.xml><?xml version="1.0" encoding="utf-8"?>
+<p:sld xmlns:a="http://schemas.openxmlformats.org/drawingml/2006/main" xmlns:r="http://schemas.openxmlformats.org/officeDocument/2006/relationships" xmlns:p="http://schemas.openxmlformats.org/presentationml/2006/main">
+  <p:cSld>
+    <p:bg>
+      <p:bgPr>
+        <a:solidFill>
+          <a:schemeClr val="accent1">
+            <a:lumMod val="40000"/>
+            <a:lumOff val="60000"/>
+          </a:schemeClr>
+        </a:solidFill>
+        <a:effectLst/>
+      </p:bgPr>
+    </p:bg>
+    <p:spTree>
+      <p:nvGrpSpPr>
+        <p:cNvPr id="1" name=""/>
+        <p:cNvGrpSpPr/>
+        <p:nvPr/>
+      </p:nvGrpSpPr>
+      <p:grpSpPr>
+        <a:xfrm>
+          <a:off x="0" y="0"/>
+          <a:ext cx="0" cy="0"/>
+          <a:chOff x="0" y="0"/>
+          <a:chExt cx="0" cy="0"/>
+        </a:xfrm>
+      </p:grpSpPr>
+      <p:sp>
+        <p:nvSpPr>
+          <p:cNvPr id="2" name="Title 1">
+            <a:extLst>
+              <a:ext uri="{FF2B5EF4-FFF2-40B4-BE49-F238E27FC236}">
+                <a16:creationId xmlns:a16="http://schemas.microsoft.com/office/drawing/2014/main" id="{A5C911E6-3C3A-4332-8ACE-3B722DAE8165}"/>
+              </a:ext>
+            </a:extLst>
+          </p:cNvPr>
+          <p:cNvSpPr>
+            <a:spLocks noGrp="1"/>
+          </p:cNvSpPr>
+          <p:nvPr>
+            <p:ph type="title"/>
+          </p:nvPr>
+        </p:nvSpPr>
+        <p:spPr/>
+        <p:txBody>
+          <a:bodyPr/>
+          <a:lstStyle/>
+          <a:p>
+            <a:r>
+              <a:rPr lang="en-US" dirty="0"/>
+              <a:t>Python Code </a:t>
+            </a:r>
+            <a:r>
+              <a:rPr lang="en-US" dirty="0" err="1"/>
+              <a:t>Coventions</a:t>
+            </a:r>
+            <a:endParaRPr lang="en-NZ" dirty="0"/>
+          </a:p>
+        </p:txBody>
+      </p:sp>
+      <p:sp>
+        <p:nvSpPr>
+          <p:cNvPr id="3" name="Text Placeholder 2">
+            <a:extLst>
+              <a:ext uri="{FF2B5EF4-FFF2-40B4-BE49-F238E27FC236}">
+                <a16:creationId xmlns:a16="http://schemas.microsoft.com/office/drawing/2014/main" id="{E4BDDDBC-7BAC-45B1-A8EA-6098ACA6CFE7}"/>
+              </a:ext>
+            </a:extLst>
+          </p:cNvPr>
+          <p:cNvSpPr>
+            <a:spLocks noGrp="1"/>
+          </p:cNvSpPr>
+          <p:nvPr>
+            <p:ph type="body" idx="1"/>
+          </p:nvPr>
+        </p:nvSpPr>
+        <p:spPr/>
+        <p:txBody>
+          <a:bodyPr/>
+          <a:lstStyle/>
+          <a:p>
+            <a:pPr marL="114300" indent="0">
+              <a:buNone/>
+            </a:pPr>
+            <a:r>
+              <a:rPr lang="en-US" dirty="0"/>
+              <a:t>Show screenshot of PEP8 testing both before and after.</a:t>
+            </a:r>
+            <a:endParaRPr lang="en-NZ" dirty="0"/>
           </a:p>
         </p:txBody>
       </p:sp>
     </p:spTree>
     <p:extLst>
       <p:ext uri="{BB962C8B-B14F-4D97-AF65-F5344CB8AC3E}">
-        <p14:creationId xmlns:p14="http://schemas.microsoft.com/office/powerpoint/2010/main" val="2203232476"/>
+        <p14:creationId xmlns:p14="http://schemas.microsoft.com/office/powerpoint/2010/main" val="1602139299"/>
       </p:ext>
     </p:extLst>
   </p:cSld>
@@ -11743,7 +12536,7 @@
 </p:sld>
 </file>
 
-<file path=ppt/slides/slide34.xml><?xml version="1.0" encoding="utf-8"?>
+<file path=ppt/slides/slide35.xml><?xml version="1.0" encoding="utf-8"?>
 <p:sld xmlns:a="http://schemas.openxmlformats.org/drawingml/2006/main" xmlns:r="http://schemas.openxmlformats.org/officeDocument/2006/relationships" xmlns:p="http://schemas.openxmlformats.org/presentationml/2006/main">
   <p:cSld>
     <p:bg>
@@ -11846,6 +12639,128 @@
             </a:pPr>
             <a:r>
               <a:rPr lang="en-NZ" i="1" dirty="0"/>
+              <a:t>Screenshot of errors</a:t>
+            </a:r>
+            <a:endParaRPr i="1" dirty="0"/>
+          </a:p>
+        </p:txBody>
+      </p:sp>
+    </p:spTree>
+    <p:extLst>
+      <p:ext uri="{BB962C8B-B14F-4D97-AF65-F5344CB8AC3E}">
+        <p14:creationId xmlns:p14="http://schemas.microsoft.com/office/powerpoint/2010/main" val="2203232476"/>
+      </p:ext>
+    </p:extLst>
+  </p:cSld>
+  <p:clrMapOvr>
+    <a:masterClrMapping/>
+  </p:clrMapOvr>
+</p:sld>
+</file>
+
+<file path=ppt/slides/slide36.xml><?xml version="1.0" encoding="utf-8"?>
+<p:sld xmlns:a="http://schemas.openxmlformats.org/drawingml/2006/main" xmlns:r="http://schemas.openxmlformats.org/officeDocument/2006/relationships" xmlns:p="http://schemas.openxmlformats.org/presentationml/2006/main">
+  <p:cSld>
+    <p:bg>
+      <p:bgPr>
+        <a:solidFill>
+          <a:srgbClr val="D9EAD3"/>
+        </a:solidFill>
+        <a:effectLst/>
+      </p:bgPr>
+    </p:bg>
+    <p:spTree>
+      <p:nvGrpSpPr>
+        <p:cNvPr id="1" name="Shape 83"/>
+        <p:cNvGrpSpPr/>
+        <p:nvPr/>
+      </p:nvGrpSpPr>
+      <p:grpSpPr>
+        <a:xfrm>
+          <a:off x="0" y="0"/>
+          <a:ext cx="0" cy="0"/>
+          <a:chOff x="0" y="0"/>
+          <a:chExt cx="0" cy="0"/>
+        </a:xfrm>
+      </p:grpSpPr>
+      <p:sp>
+        <p:nvSpPr>
+          <p:cNvPr id="84" name="Google Shape;84;p18"/>
+          <p:cNvSpPr txBox="1">
+            <a:spLocks noGrp="1"/>
+          </p:cNvSpPr>
+          <p:nvPr>
+            <p:ph type="title"/>
+          </p:nvPr>
+        </p:nvSpPr>
+        <p:spPr>
+          <a:xfrm>
+            <a:off x="311700" y="445025"/>
+            <a:ext cx="8520600" cy="572700"/>
+          </a:xfrm>
+          <a:prstGeom prst="rect">
+            <a:avLst/>
+          </a:prstGeom>
+        </p:spPr>
+        <p:txBody>
+          <a:bodyPr spcFirstLastPara="1" wrap="square" lIns="91425" tIns="91425" rIns="91425" bIns="91425" anchor="t" anchorCtr="0">
+            <a:noAutofit/>
+          </a:bodyPr>
+          <a:lstStyle/>
+          <a:p>
+            <a:pPr marL="0" lvl="0" indent="0" algn="l" rtl="0">
+              <a:spcBef>
+                <a:spcPts val="0"/>
+              </a:spcBef>
+              <a:spcAft>
+                <a:spcPts val="0"/>
+              </a:spcAft>
+              <a:buNone/>
+            </a:pPr>
+            <a:r>
+              <a:rPr lang="en-NZ" dirty="0"/>
+              <a:t>Python convention testing (PEP8)</a:t>
+            </a:r>
+            <a:endParaRPr dirty="0"/>
+          </a:p>
+        </p:txBody>
+      </p:sp>
+      <p:sp>
+        <p:nvSpPr>
+          <p:cNvPr id="85" name="Google Shape;85;p18"/>
+          <p:cNvSpPr txBox="1">
+            <a:spLocks noGrp="1"/>
+          </p:cNvSpPr>
+          <p:nvPr>
+            <p:ph type="body" idx="1"/>
+          </p:nvPr>
+        </p:nvSpPr>
+        <p:spPr>
+          <a:xfrm>
+            <a:off x="311700" y="1152475"/>
+            <a:ext cx="8464200" cy="3739200"/>
+          </a:xfrm>
+          <a:prstGeom prst="rect">
+            <a:avLst/>
+          </a:prstGeom>
+        </p:spPr>
+        <p:txBody>
+          <a:bodyPr spcFirstLastPara="1" wrap="square" lIns="91425" tIns="91425" rIns="91425" bIns="91425" anchor="t" anchorCtr="0">
+            <a:noAutofit/>
+          </a:bodyPr>
+          <a:lstStyle/>
+          <a:p>
+            <a:pPr marL="0" lvl="0" indent="0" algn="l" rtl="0">
+              <a:spcBef>
+                <a:spcPts val="0"/>
+              </a:spcBef>
+              <a:spcAft>
+                <a:spcPts val="1600"/>
+              </a:spcAft>
+              <a:buNone/>
+            </a:pPr>
+            <a:r>
+              <a:rPr lang="en-NZ" i="1" dirty="0"/>
               <a:t>Screenshot after errors fixed</a:t>
             </a:r>
             <a:endParaRPr i="1" dirty="0"/>
@@ -11865,7 +12780,7 @@
 </p:sld>
 </file>
 
-<file path=ppt/slides/slide35.xml><?xml version="1.0" encoding="utf-8"?>
+<file path=ppt/slides/slide37.xml><?xml version="1.0" encoding="utf-8"?>
 <p:sld xmlns:a="http://schemas.openxmlformats.org/drawingml/2006/main" xmlns:r="http://schemas.openxmlformats.org/officeDocument/2006/relationships" xmlns:p="http://schemas.openxmlformats.org/presentationml/2006/main">
   <p:cSld>
     <p:bg>

</xml_diff>